<commit_message>
FT64v7 - docs update
- fixed opcodes for indexed loads
-
</commit_message>
<xml_diff>
--- a/FT64/v7/doc/TestSystem.pptx
+++ b/FT64/v7/doc/TestSystem.pptx
@@ -6,6 +6,7 @@
   </p:sldMasterIdLst>
   <p:sldIdLst>
     <p:sldId id="256" r:id="rId2"/>
+    <p:sldId id="257" r:id="rId3"/>
   </p:sldIdLst>
   <p:sldSz cx="12192000" cy="6858000"/>
   <p:notesSz cx="6858000" cy="9144000"/>
@@ -104,6 +105,11 @@
       </a:defRPr>
     </a:lvl9pPr>
   </p:defaultTextStyle>
+  <p:extLst>
+    <p:ext uri="{EFAFB233-063F-42B5-8137-9DF3F51BA10A}">
+      <p15:sldGuideLst xmlns:p15="http://schemas.microsoft.com/office/powerpoint/2012/main"/>
+    </p:ext>
+  </p:extLst>
 </p:presentation>
 </file>
 
@@ -256,7 +262,7 @@
           <a:p>
             <a:fld id="{A4679F00-064F-412E-8940-4037B81AF165}" type="datetimeFigureOut">
               <a:rPr lang="en-CA" smtClean="0"/>
-              <a:t>2018-10-11</a:t>
+              <a:t>2019-03-16</a:t>
             </a:fld>
             <a:endParaRPr lang="en-CA"/>
           </a:p>
@@ -456,7 +462,7 @@
           <a:p>
             <a:fld id="{A4679F00-064F-412E-8940-4037B81AF165}" type="datetimeFigureOut">
               <a:rPr lang="en-CA" smtClean="0"/>
-              <a:t>2018-10-11</a:t>
+              <a:t>2019-03-16</a:t>
             </a:fld>
             <a:endParaRPr lang="en-CA"/>
           </a:p>
@@ -666,7 +672,7 @@
           <a:p>
             <a:fld id="{A4679F00-064F-412E-8940-4037B81AF165}" type="datetimeFigureOut">
               <a:rPr lang="en-CA" smtClean="0"/>
-              <a:t>2018-10-11</a:t>
+              <a:t>2019-03-16</a:t>
             </a:fld>
             <a:endParaRPr lang="en-CA"/>
           </a:p>
@@ -866,7 +872,7 @@
           <a:p>
             <a:fld id="{A4679F00-064F-412E-8940-4037B81AF165}" type="datetimeFigureOut">
               <a:rPr lang="en-CA" smtClean="0"/>
-              <a:t>2018-10-11</a:t>
+              <a:t>2019-03-16</a:t>
             </a:fld>
             <a:endParaRPr lang="en-CA"/>
           </a:p>
@@ -1142,7 +1148,7 @@
           <a:p>
             <a:fld id="{A4679F00-064F-412E-8940-4037B81AF165}" type="datetimeFigureOut">
               <a:rPr lang="en-CA" smtClean="0"/>
-              <a:t>2018-10-11</a:t>
+              <a:t>2019-03-16</a:t>
             </a:fld>
             <a:endParaRPr lang="en-CA"/>
           </a:p>
@@ -1410,7 +1416,7 @@
           <a:p>
             <a:fld id="{A4679F00-064F-412E-8940-4037B81AF165}" type="datetimeFigureOut">
               <a:rPr lang="en-CA" smtClean="0"/>
-              <a:t>2018-10-11</a:t>
+              <a:t>2019-03-16</a:t>
             </a:fld>
             <a:endParaRPr lang="en-CA"/>
           </a:p>
@@ -1825,7 +1831,7 @@
           <a:p>
             <a:fld id="{A4679F00-064F-412E-8940-4037B81AF165}" type="datetimeFigureOut">
               <a:rPr lang="en-CA" smtClean="0"/>
-              <a:t>2018-10-11</a:t>
+              <a:t>2019-03-16</a:t>
             </a:fld>
             <a:endParaRPr lang="en-CA"/>
           </a:p>
@@ -1967,7 +1973,7 @@
           <a:p>
             <a:fld id="{A4679F00-064F-412E-8940-4037B81AF165}" type="datetimeFigureOut">
               <a:rPr lang="en-CA" smtClean="0"/>
-              <a:t>2018-10-11</a:t>
+              <a:t>2019-03-16</a:t>
             </a:fld>
             <a:endParaRPr lang="en-CA"/>
           </a:p>
@@ -2080,7 +2086,7 @@
           <a:p>
             <a:fld id="{A4679F00-064F-412E-8940-4037B81AF165}" type="datetimeFigureOut">
               <a:rPr lang="en-CA" smtClean="0"/>
-              <a:t>2018-10-11</a:t>
+              <a:t>2019-03-16</a:t>
             </a:fld>
             <a:endParaRPr lang="en-CA"/>
           </a:p>
@@ -2393,7 +2399,7 @@
           <a:p>
             <a:fld id="{A4679F00-064F-412E-8940-4037B81AF165}" type="datetimeFigureOut">
               <a:rPr lang="en-CA" smtClean="0"/>
-              <a:t>2018-10-11</a:t>
+              <a:t>2019-03-16</a:t>
             </a:fld>
             <a:endParaRPr lang="en-CA"/>
           </a:p>
@@ -2682,7 +2688,7 @@
           <a:p>
             <a:fld id="{A4679F00-064F-412E-8940-4037B81AF165}" type="datetimeFigureOut">
               <a:rPr lang="en-CA" smtClean="0"/>
-              <a:t>2018-10-11</a:t>
+              <a:t>2019-03-16</a:t>
             </a:fld>
             <a:endParaRPr lang="en-CA"/>
           </a:p>
@@ -2925,7 +2931,7 @@
           <a:p>
             <a:fld id="{A4679F00-064F-412E-8940-4037B81AF165}" type="datetimeFigureOut">
               <a:rPr lang="en-CA" smtClean="0"/>
-              <a:t>2018-10-11</a:t>
+              <a:t>2019-03-16</a:t>
             </a:fld>
             <a:endParaRPr lang="en-CA"/>
           </a:p>
@@ -5206,6 +5212,2820 @@
 </p:sld>
 </file>
 
+<file path=ppt/slides/slide2.xml><?xml version="1.0" encoding="utf-8"?>
+<p:sld xmlns:a="http://schemas.openxmlformats.org/drawingml/2006/main" xmlns:r="http://schemas.openxmlformats.org/officeDocument/2006/relationships" xmlns:p="http://schemas.openxmlformats.org/presentationml/2006/main">
+  <p:cSld>
+    <p:spTree>
+      <p:nvGrpSpPr>
+        <p:cNvPr id="1" name=""/>
+        <p:cNvGrpSpPr/>
+        <p:nvPr/>
+      </p:nvGrpSpPr>
+      <p:grpSpPr>
+        <a:xfrm>
+          <a:off x="0" y="0"/>
+          <a:ext cx="0" cy="0"/>
+          <a:chOff x="0" y="0"/>
+          <a:chExt cx="0" cy="0"/>
+        </a:xfrm>
+      </p:grpSpPr>
+      <p:sp>
+        <p:nvSpPr>
+          <p:cNvPr id="2" name="Title 1">
+            <a:extLst>
+              <a:ext uri="{FF2B5EF4-FFF2-40B4-BE49-F238E27FC236}">
+                <a16:creationId xmlns:a16="http://schemas.microsoft.com/office/drawing/2014/main" id="{D35CF559-821E-48BB-89A0-A36A1E75C792}"/>
+              </a:ext>
+            </a:extLst>
+          </p:cNvPr>
+          <p:cNvSpPr>
+            <a:spLocks noGrp="1"/>
+          </p:cNvSpPr>
+          <p:nvPr>
+            <p:ph type="title"/>
+          </p:nvPr>
+        </p:nvSpPr>
+        <p:spPr>
+          <a:xfrm>
+            <a:off x="838200" y="365125"/>
+            <a:ext cx="10515600" cy="648863"/>
+          </a:xfrm>
+        </p:spPr>
+        <p:txBody>
+          <a:bodyPr>
+            <a:normAutofit fontScale="90000"/>
+          </a:bodyPr>
+          <a:lstStyle/>
+          <a:p>
+            <a:r>
+              <a:rPr lang="en-CA" dirty="0"/>
+              <a:t>FT64v7 Test System – Simplified Block Diagram</a:t>
+            </a:r>
+          </a:p>
+        </p:txBody>
+      </p:sp>
+      <p:sp>
+        <p:nvSpPr>
+          <p:cNvPr id="4" name="Rectangle 3">
+            <a:extLst>
+              <a:ext uri="{FF2B5EF4-FFF2-40B4-BE49-F238E27FC236}">
+                <a16:creationId xmlns:a16="http://schemas.microsoft.com/office/drawing/2014/main" id="{646AE6CB-BC77-4D6A-9321-D1B74D047A6A}"/>
+              </a:ext>
+            </a:extLst>
+          </p:cNvPr>
+          <p:cNvSpPr/>
+          <p:nvPr/>
+        </p:nvSpPr>
+        <p:spPr>
+          <a:xfrm>
+            <a:off x="887861" y="2603932"/>
+            <a:ext cx="1206781" cy="1627241"/>
+          </a:xfrm>
+          <a:prstGeom prst="rect">
+            <a:avLst/>
+          </a:prstGeom>
+        </p:spPr>
+        <p:style>
+          <a:lnRef idx="2">
+            <a:schemeClr val="accent1">
+              <a:shade val="50000"/>
+            </a:schemeClr>
+          </a:lnRef>
+          <a:fillRef idx="1">
+            <a:schemeClr val="accent1"/>
+          </a:fillRef>
+          <a:effectRef idx="0">
+            <a:schemeClr val="accent1"/>
+          </a:effectRef>
+          <a:fontRef idx="minor">
+            <a:schemeClr val="lt1"/>
+          </a:fontRef>
+        </p:style>
+        <p:txBody>
+          <a:bodyPr rtlCol="0" anchor="ctr"/>
+          <a:lstStyle/>
+          <a:p>
+            <a:pPr algn="ctr"/>
+            <a:r>
+              <a:rPr lang="en-CA" sz="1050" dirty="0"/>
+              <a:t>FT64 MPU</a:t>
+            </a:r>
+          </a:p>
+          <a:p>
+            <a:pPr algn="ctr"/>
+            <a:r>
+              <a:rPr lang="en-CA" sz="1050" dirty="0"/>
+              <a:t>(PIT, PIC, MMU, CPU)</a:t>
+            </a:r>
+          </a:p>
+        </p:txBody>
+      </p:sp>
+      <p:sp>
+        <p:nvSpPr>
+          <p:cNvPr id="5" name="Rectangle 4">
+            <a:extLst>
+              <a:ext uri="{FF2B5EF4-FFF2-40B4-BE49-F238E27FC236}">
+                <a16:creationId xmlns:a16="http://schemas.microsoft.com/office/drawing/2014/main" id="{157193E9-1F88-48CD-9277-649AD51A4FE1}"/>
+              </a:ext>
+            </a:extLst>
+          </p:cNvPr>
+          <p:cNvSpPr/>
+          <p:nvPr/>
+        </p:nvSpPr>
+        <p:spPr>
+          <a:xfrm>
+            <a:off x="2579136" y="3475956"/>
+            <a:ext cx="461727" cy="678763"/>
+          </a:xfrm>
+          <a:prstGeom prst="rect">
+            <a:avLst/>
+          </a:prstGeom>
+        </p:spPr>
+        <p:style>
+          <a:lnRef idx="2">
+            <a:schemeClr val="accent1">
+              <a:shade val="50000"/>
+            </a:schemeClr>
+          </a:lnRef>
+          <a:fillRef idx="1">
+            <a:schemeClr val="accent1"/>
+          </a:fillRef>
+          <a:effectRef idx="0">
+            <a:schemeClr val="accent1"/>
+          </a:effectRef>
+          <a:fontRef idx="minor">
+            <a:schemeClr val="lt1"/>
+          </a:fontRef>
+        </p:style>
+        <p:txBody>
+          <a:bodyPr rtlCol="0" anchor="ctr"/>
+          <a:lstStyle/>
+          <a:p>
+            <a:pPr algn="ctr"/>
+            <a:r>
+              <a:rPr lang="en-CA" sz="1000" dirty="0"/>
+              <a:t>Reg. Input Mux</a:t>
+            </a:r>
+          </a:p>
+        </p:txBody>
+      </p:sp>
+      <p:sp>
+        <p:nvSpPr>
+          <p:cNvPr id="6" name="Rectangle 5">
+            <a:extLst>
+              <a:ext uri="{FF2B5EF4-FFF2-40B4-BE49-F238E27FC236}">
+                <a16:creationId xmlns:a16="http://schemas.microsoft.com/office/drawing/2014/main" id="{4AA42893-7D55-4860-B4BE-51F9254B9AF9}"/>
+              </a:ext>
+            </a:extLst>
+          </p:cNvPr>
+          <p:cNvSpPr/>
+          <p:nvPr/>
+        </p:nvSpPr>
+        <p:spPr>
+          <a:xfrm>
+            <a:off x="3671047" y="1707797"/>
+            <a:ext cx="914399" cy="303111"/>
+          </a:xfrm>
+          <a:prstGeom prst="rect">
+            <a:avLst/>
+          </a:prstGeom>
+        </p:spPr>
+        <p:style>
+          <a:lnRef idx="2">
+            <a:schemeClr val="accent1">
+              <a:shade val="50000"/>
+            </a:schemeClr>
+          </a:lnRef>
+          <a:fillRef idx="1">
+            <a:schemeClr val="accent1"/>
+          </a:fillRef>
+          <a:effectRef idx="0">
+            <a:schemeClr val="accent1"/>
+          </a:effectRef>
+          <a:fontRef idx="minor">
+            <a:schemeClr val="lt1"/>
+          </a:fontRef>
+        </p:style>
+        <p:txBody>
+          <a:bodyPr rtlCol="0" anchor="ctr"/>
+          <a:lstStyle/>
+          <a:p>
+            <a:pPr algn="ctr"/>
+            <a:r>
+              <a:rPr lang="en-CA" sz="1000" dirty="0"/>
+              <a:t>BOOT ROM</a:t>
+            </a:r>
+          </a:p>
+        </p:txBody>
+      </p:sp>
+      <p:sp>
+        <p:nvSpPr>
+          <p:cNvPr id="7" name="Rectangle 6">
+            <a:extLst>
+              <a:ext uri="{FF2B5EF4-FFF2-40B4-BE49-F238E27FC236}">
+                <a16:creationId xmlns:a16="http://schemas.microsoft.com/office/drawing/2014/main" id="{ED37D145-818E-4A42-992F-861167F119FC}"/>
+              </a:ext>
+            </a:extLst>
+          </p:cNvPr>
+          <p:cNvSpPr/>
+          <p:nvPr/>
+        </p:nvSpPr>
+        <p:spPr>
+          <a:xfrm>
+            <a:off x="3671048" y="2138380"/>
+            <a:ext cx="914400" cy="1091444"/>
+          </a:xfrm>
+          <a:prstGeom prst="rect">
+            <a:avLst/>
+          </a:prstGeom>
+        </p:spPr>
+        <p:style>
+          <a:lnRef idx="2">
+            <a:schemeClr val="accent1">
+              <a:shade val="50000"/>
+            </a:schemeClr>
+          </a:lnRef>
+          <a:fillRef idx="1">
+            <a:schemeClr val="accent1"/>
+          </a:fillRef>
+          <a:effectRef idx="0">
+            <a:schemeClr val="accent1"/>
+          </a:effectRef>
+          <a:fontRef idx="minor">
+            <a:schemeClr val="lt1"/>
+          </a:fontRef>
+        </p:style>
+        <p:txBody>
+          <a:bodyPr rtlCol="0" anchor="ctr"/>
+          <a:lstStyle/>
+          <a:p>
+            <a:pPr algn="ctr"/>
+            <a:r>
+              <a:rPr lang="en-CA" sz="1000" dirty="0"/>
+              <a:t>BRIDGE1</a:t>
+            </a:r>
+          </a:p>
+          <a:p>
+            <a:pPr algn="ctr"/>
+            <a:r>
+              <a:rPr lang="en-CA" sz="1000" dirty="0"/>
+              <a:t>(Video)</a:t>
+            </a:r>
+          </a:p>
+        </p:txBody>
+      </p:sp>
+      <p:sp>
+        <p:nvSpPr>
+          <p:cNvPr id="9" name="Rectangle 8">
+            <a:extLst>
+              <a:ext uri="{FF2B5EF4-FFF2-40B4-BE49-F238E27FC236}">
+                <a16:creationId xmlns:a16="http://schemas.microsoft.com/office/drawing/2014/main" id="{3841245B-5491-47A5-BAEF-DC555EC1890D}"/>
+              </a:ext>
+            </a:extLst>
+          </p:cNvPr>
+          <p:cNvSpPr/>
+          <p:nvPr/>
+        </p:nvSpPr>
+        <p:spPr>
+          <a:xfrm>
+            <a:off x="3671048" y="3352898"/>
+            <a:ext cx="914400" cy="1091444"/>
+          </a:xfrm>
+          <a:prstGeom prst="rect">
+            <a:avLst/>
+          </a:prstGeom>
+        </p:spPr>
+        <p:style>
+          <a:lnRef idx="2">
+            <a:schemeClr val="accent1">
+              <a:shade val="50000"/>
+            </a:schemeClr>
+          </a:lnRef>
+          <a:fillRef idx="1">
+            <a:schemeClr val="accent1"/>
+          </a:fillRef>
+          <a:effectRef idx="0">
+            <a:schemeClr val="accent1"/>
+          </a:effectRef>
+          <a:fontRef idx="minor">
+            <a:schemeClr val="lt1"/>
+          </a:fontRef>
+        </p:style>
+        <p:txBody>
+          <a:bodyPr rtlCol="0" anchor="ctr"/>
+          <a:lstStyle/>
+          <a:p>
+            <a:pPr algn="ctr"/>
+            <a:r>
+              <a:rPr lang="en-CA" sz="1000" dirty="0"/>
+              <a:t>BRIDGE2</a:t>
+            </a:r>
+          </a:p>
+          <a:p>
+            <a:pPr algn="ctr"/>
+            <a:r>
+              <a:rPr lang="en-CA" sz="1000" dirty="0"/>
+              <a:t>(Audio)</a:t>
+            </a:r>
+          </a:p>
+        </p:txBody>
+      </p:sp>
+      <p:sp>
+        <p:nvSpPr>
+          <p:cNvPr id="10" name="Rectangle 9">
+            <a:extLst>
+              <a:ext uri="{FF2B5EF4-FFF2-40B4-BE49-F238E27FC236}">
+                <a16:creationId xmlns:a16="http://schemas.microsoft.com/office/drawing/2014/main" id="{C6D59213-DBE8-4B9C-B9EC-88151FD9F161}"/>
+              </a:ext>
+            </a:extLst>
+          </p:cNvPr>
+          <p:cNvSpPr/>
+          <p:nvPr/>
+        </p:nvSpPr>
+        <p:spPr>
+          <a:xfrm>
+            <a:off x="3671047" y="4571813"/>
+            <a:ext cx="914400" cy="1255879"/>
+          </a:xfrm>
+          <a:prstGeom prst="rect">
+            <a:avLst/>
+          </a:prstGeom>
+        </p:spPr>
+        <p:style>
+          <a:lnRef idx="2">
+            <a:schemeClr val="accent1">
+              <a:shade val="50000"/>
+            </a:schemeClr>
+          </a:lnRef>
+          <a:fillRef idx="1">
+            <a:schemeClr val="accent1"/>
+          </a:fillRef>
+          <a:effectRef idx="0">
+            <a:schemeClr val="accent1"/>
+          </a:effectRef>
+          <a:fontRef idx="minor">
+            <a:schemeClr val="lt1"/>
+          </a:fontRef>
+        </p:style>
+        <p:txBody>
+          <a:bodyPr rtlCol="0" anchor="ctr"/>
+          <a:lstStyle/>
+          <a:p>
+            <a:pPr algn="ctr"/>
+            <a:r>
+              <a:rPr lang="en-CA" sz="1000" dirty="0"/>
+              <a:t>BRIDGE3</a:t>
+            </a:r>
+          </a:p>
+          <a:p>
+            <a:pPr algn="ctr"/>
+            <a:r>
+              <a:rPr lang="en-CA" sz="1000" dirty="0"/>
+              <a:t>(Storage)</a:t>
+            </a:r>
+          </a:p>
+        </p:txBody>
+      </p:sp>
+      <p:sp>
+        <p:nvSpPr>
+          <p:cNvPr id="12" name="Rectangle 11">
+            <a:extLst>
+              <a:ext uri="{FF2B5EF4-FFF2-40B4-BE49-F238E27FC236}">
+                <a16:creationId xmlns:a16="http://schemas.microsoft.com/office/drawing/2014/main" id="{B7925EA1-9F88-421B-BF05-E185C70E4DC0}"/>
+              </a:ext>
+            </a:extLst>
+          </p:cNvPr>
+          <p:cNvSpPr/>
+          <p:nvPr/>
+        </p:nvSpPr>
+        <p:spPr>
+          <a:xfrm>
+            <a:off x="5541824" y="2120520"/>
+            <a:ext cx="1108363" cy="334255"/>
+          </a:xfrm>
+          <a:prstGeom prst="rect">
+            <a:avLst/>
+          </a:prstGeom>
+        </p:spPr>
+        <p:style>
+          <a:lnRef idx="2">
+            <a:schemeClr val="accent1">
+              <a:shade val="50000"/>
+            </a:schemeClr>
+          </a:lnRef>
+          <a:fillRef idx="1">
+            <a:schemeClr val="accent1"/>
+          </a:fillRef>
+          <a:effectRef idx="0">
+            <a:schemeClr val="accent1"/>
+          </a:effectRef>
+          <a:fontRef idx="minor">
+            <a:schemeClr val="lt1"/>
+          </a:fontRef>
+        </p:style>
+        <p:txBody>
+          <a:bodyPr rtlCol="0" anchor="ctr"/>
+          <a:lstStyle/>
+          <a:p>
+            <a:pPr algn="ctr"/>
+            <a:r>
+              <a:rPr lang="en-CA" sz="1000" dirty="0"/>
+              <a:t>BITMAP</a:t>
+            </a:r>
+          </a:p>
+          <a:p>
+            <a:pPr algn="ctr"/>
+            <a:r>
+              <a:rPr lang="en-CA" sz="1000" dirty="0"/>
+              <a:t>CONTROLLER</a:t>
+            </a:r>
+          </a:p>
+        </p:txBody>
+      </p:sp>
+      <p:sp>
+        <p:nvSpPr>
+          <p:cNvPr id="13" name="Rectangle 12">
+            <a:extLst>
+              <a:ext uri="{FF2B5EF4-FFF2-40B4-BE49-F238E27FC236}">
+                <a16:creationId xmlns:a16="http://schemas.microsoft.com/office/drawing/2014/main" id="{A2973D31-C0BE-44FB-91C1-1220BA060FDA}"/>
+              </a:ext>
+            </a:extLst>
+          </p:cNvPr>
+          <p:cNvSpPr/>
+          <p:nvPr/>
+        </p:nvSpPr>
+        <p:spPr>
+          <a:xfrm>
+            <a:off x="5541823" y="2513240"/>
+            <a:ext cx="1108363" cy="334255"/>
+          </a:xfrm>
+          <a:prstGeom prst="rect">
+            <a:avLst/>
+          </a:prstGeom>
+        </p:spPr>
+        <p:style>
+          <a:lnRef idx="2">
+            <a:schemeClr val="accent1">
+              <a:shade val="50000"/>
+            </a:schemeClr>
+          </a:lnRef>
+          <a:fillRef idx="1">
+            <a:schemeClr val="accent1"/>
+          </a:fillRef>
+          <a:effectRef idx="0">
+            <a:schemeClr val="accent1"/>
+          </a:effectRef>
+          <a:fontRef idx="minor">
+            <a:schemeClr val="lt1"/>
+          </a:fontRef>
+        </p:style>
+        <p:txBody>
+          <a:bodyPr rtlCol="0" anchor="ctr"/>
+          <a:lstStyle/>
+          <a:p>
+            <a:pPr algn="ctr"/>
+            <a:r>
+              <a:rPr lang="en-CA" sz="1000" dirty="0"/>
+              <a:t>SPRITE</a:t>
+            </a:r>
+          </a:p>
+          <a:p>
+            <a:pPr algn="ctr"/>
+            <a:r>
+              <a:rPr lang="en-CA" sz="1000" dirty="0"/>
+              <a:t>CONTROLLER</a:t>
+            </a:r>
+          </a:p>
+        </p:txBody>
+      </p:sp>
+      <p:sp>
+        <p:nvSpPr>
+          <p:cNvPr id="14" name="Rectangle 13">
+            <a:extLst>
+              <a:ext uri="{FF2B5EF4-FFF2-40B4-BE49-F238E27FC236}">
+                <a16:creationId xmlns:a16="http://schemas.microsoft.com/office/drawing/2014/main" id="{C8822E10-5415-4A48-ABC4-5E2D65912DFA}"/>
+              </a:ext>
+            </a:extLst>
+          </p:cNvPr>
+          <p:cNvSpPr/>
+          <p:nvPr/>
+        </p:nvSpPr>
+        <p:spPr>
+          <a:xfrm>
+            <a:off x="5541822" y="2905960"/>
+            <a:ext cx="1108363" cy="306004"/>
+          </a:xfrm>
+          <a:prstGeom prst="rect">
+            <a:avLst/>
+          </a:prstGeom>
+        </p:spPr>
+        <p:style>
+          <a:lnRef idx="2">
+            <a:schemeClr val="accent1">
+              <a:shade val="50000"/>
+            </a:schemeClr>
+          </a:lnRef>
+          <a:fillRef idx="1">
+            <a:schemeClr val="accent1"/>
+          </a:fillRef>
+          <a:effectRef idx="0">
+            <a:schemeClr val="accent1"/>
+          </a:effectRef>
+          <a:fontRef idx="minor">
+            <a:schemeClr val="lt1"/>
+          </a:fontRef>
+        </p:style>
+        <p:txBody>
+          <a:bodyPr rtlCol="0" anchor="ctr"/>
+          <a:lstStyle/>
+          <a:p>
+            <a:pPr algn="ctr"/>
+            <a:r>
+              <a:rPr lang="en-CA" sz="1000" dirty="0"/>
+              <a:t>(120k RAM) TEXT</a:t>
+            </a:r>
+          </a:p>
+          <a:p>
+            <a:pPr algn="ctr"/>
+            <a:r>
+              <a:rPr lang="en-CA" sz="1000" dirty="0"/>
+              <a:t>CONTROLLER</a:t>
+            </a:r>
+          </a:p>
+        </p:txBody>
+      </p:sp>
+      <p:sp>
+        <p:nvSpPr>
+          <p:cNvPr id="15" name="Rectangle 14">
+            <a:extLst>
+              <a:ext uri="{FF2B5EF4-FFF2-40B4-BE49-F238E27FC236}">
+                <a16:creationId xmlns:a16="http://schemas.microsoft.com/office/drawing/2014/main" id="{3760D62E-4C3D-4703-85E3-2BF3E10B3F50}"/>
+              </a:ext>
+            </a:extLst>
+          </p:cNvPr>
+          <p:cNvSpPr/>
+          <p:nvPr/>
+        </p:nvSpPr>
+        <p:spPr>
+          <a:xfrm>
+            <a:off x="5541821" y="3335038"/>
+            <a:ext cx="1108363" cy="165030"/>
+          </a:xfrm>
+          <a:prstGeom prst="rect">
+            <a:avLst/>
+          </a:prstGeom>
+        </p:spPr>
+        <p:style>
+          <a:lnRef idx="2">
+            <a:schemeClr val="accent1">
+              <a:shade val="50000"/>
+            </a:schemeClr>
+          </a:lnRef>
+          <a:fillRef idx="1">
+            <a:schemeClr val="accent1"/>
+          </a:fillRef>
+          <a:effectRef idx="0">
+            <a:schemeClr val="accent1"/>
+          </a:effectRef>
+          <a:fontRef idx="minor">
+            <a:schemeClr val="lt1"/>
+          </a:fontRef>
+        </p:style>
+        <p:txBody>
+          <a:bodyPr rtlCol="0" anchor="ctr"/>
+          <a:lstStyle/>
+          <a:p>
+            <a:pPr algn="ctr"/>
+            <a:r>
+              <a:rPr lang="en-CA" sz="1000" dirty="0"/>
+              <a:t>LED / BUTTON</a:t>
+            </a:r>
+          </a:p>
+        </p:txBody>
+      </p:sp>
+      <p:sp>
+        <p:nvSpPr>
+          <p:cNvPr id="16" name="Rectangle 15">
+            <a:extLst>
+              <a:ext uri="{FF2B5EF4-FFF2-40B4-BE49-F238E27FC236}">
+                <a16:creationId xmlns:a16="http://schemas.microsoft.com/office/drawing/2014/main" id="{9731818A-4B06-474F-9649-4A1D882D1543}"/>
+              </a:ext>
+            </a:extLst>
+          </p:cNvPr>
+          <p:cNvSpPr/>
+          <p:nvPr/>
+        </p:nvSpPr>
+        <p:spPr>
+          <a:xfrm>
+            <a:off x="5541820" y="3564940"/>
+            <a:ext cx="1108363" cy="162818"/>
+          </a:xfrm>
+          <a:prstGeom prst="rect">
+            <a:avLst/>
+          </a:prstGeom>
+        </p:spPr>
+        <p:style>
+          <a:lnRef idx="2">
+            <a:schemeClr val="accent1">
+              <a:shade val="50000"/>
+            </a:schemeClr>
+          </a:lnRef>
+          <a:fillRef idx="1">
+            <a:schemeClr val="accent1"/>
+          </a:fillRef>
+          <a:effectRef idx="0">
+            <a:schemeClr val="accent1"/>
+          </a:effectRef>
+          <a:fontRef idx="minor">
+            <a:schemeClr val="lt1"/>
+          </a:fontRef>
+        </p:style>
+        <p:txBody>
+          <a:bodyPr rtlCol="0" anchor="ctr"/>
+          <a:lstStyle/>
+          <a:p>
+            <a:pPr algn="ctr"/>
+            <a:r>
+              <a:rPr lang="en-CA" sz="1000" dirty="0"/>
+              <a:t>PRNG</a:t>
+            </a:r>
+          </a:p>
+        </p:txBody>
+      </p:sp>
+      <p:sp>
+        <p:nvSpPr>
+          <p:cNvPr id="17" name="Rectangle 16">
+            <a:extLst>
+              <a:ext uri="{FF2B5EF4-FFF2-40B4-BE49-F238E27FC236}">
+                <a16:creationId xmlns:a16="http://schemas.microsoft.com/office/drawing/2014/main" id="{1F12AA57-A037-453C-88C8-EC7B14A1BBD9}"/>
+              </a:ext>
+            </a:extLst>
+          </p:cNvPr>
+          <p:cNvSpPr/>
+          <p:nvPr/>
+        </p:nvSpPr>
+        <p:spPr>
+          <a:xfrm>
+            <a:off x="5541820" y="3783257"/>
+            <a:ext cx="1108363" cy="308970"/>
+          </a:xfrm>
+          <a:prstGeom prst="rect">
+            <a:avLst/>
+          </a:prstGeom>
+        </p:spPr>
+        <p:style>
+          <a:lnRef idx="2">
+            <a:schemeClr val="accent1">
+              <a:shade val="50000"/>
+            </a:schemeClr>
+          </a:lnRef>
+          <a:fillRef idx="1">
+            <a:schemeClr val="accent1"/>
+          </a:fillRef>
+          <a:effectRef idx="0">
+            <a:schemeClr val="accent1"/>
+          </a:effectRef>
+          <a:fontRef idx="minor">
+            <a:schemeClr val="lt1"/>
+          </a:fontRef>
+        </p:style>
+        <p:txBody>
+          <a:bodyPr rtlCol="0" anchor="ctr"/>
+          <a:lstStyle/>
+          <a:p>
+            <a:pPr algn="ctr"/>
+            <a:r>
+              <a:rPr lang="en-CA" sz="1000" dirty="0"/>
+              <a:t>Keyboard</a:t>
+            </a:r>
+          </a:p>
+          <a:p>
+            <a:pPr algn="ctr"/>
+            <a:r>
+              <a:rPr lang="en-CA" sz="1000" dirty="0"/>
+              <a:t>Controller</a:t>
+            </a:r>
+          </a:p>
+        </p:txBody>
+      </p:sp>
+      <p:sp>
+        <p:nvSpPr>
+          <p:cNvPr id="18" name="Rectangle 17">
+            <a:extLst>
+              <a:ext uri="{FF2B5EF4-FFF2-40B4-BE49-F238E27FC236}">
+                <a16:creationId xmlns:a16="http://schemas.microsoft.com/office/drawing/2014/main" id="{1C38A2E6-409C-44B2-A34D-4EA5CBDF7651}"/>
+              </a:ext>
+            </a:extLst>
+          </p:cNvPr>
+          <p:cNvSpPr/>
+          <p:nvPr/>
+        </p:nvSpPr>
+        <p:spPr>
+          <a:xfrm>
+            <a:off x="5541819" y="4164655"/>
+            <a:ext cx="1108363" cy="261827"/>
+          </a:xfrm>
+          <a:prstGeom prst="rect">
+            <a:avLst/>
+          </a:prstGeom>
+        </p:spPr>
+        <p:style>
+          <a:lnRef idx="2">
+            <a:schemeClr val="accent1">
+              <a:shade val="50000"/>
+            </a:schemeClr>
+          </a:lnRef>
+          <a:fillRef idx="1">
+            <a:schemeClr val="accent1"/>
+          </a:fillRef>
+          <a:effectRef idx="0">
+            <a:schemeClr val="accent1"/>
+          </a:effectRef>
+          <a:fontRef idx="minor">
+            <a:schemeClr val="lt1"/>
+          </a:fontRef>
+        </p:style>
+        <p:txBody>
+          <a:bodyPr rtlCol="0" anchor="ctr"/>
+          <a:lstStyle/>
+          <a:p>
+            <a:pPr algn="ctr"/>
+            <a:r>
+              <a:rPr lang="en-CA" sz="1000" dirty="0"/>
+              <a:t>AUDIO</a:t>
+            </a:r>
+          </a:p>
+          <a:p>
+            <a:pPr algn="ctr"/>
+            <a:r>
+              <a:rPr lang="en-CA" sz="1000" dirty="0"/>
+              <a:t>CONTROLLER</a:t>
+            </a:r>
+          </a:p>
+        </p:txBody>
+      </p:sp>
+      <p:sp>
+        <p:nvSpPr>
+          <p:cNvPr id="19" name="Rectangle 18">
+            <a:extLst>
+              <a:ext uri="{FF2B5EF4-FFF2-40B4-BE49-F238E27FC236}">
+                <a16:creationId xmlns:a16="http://schemas.microsoft.com/office/drawing/2014/main" id="{F717CF06-615D-4059-8648-39B69AC9AE09}"/>
+              </a:ext>
+            </a:extLst>
+          </p:cNvPr>
+          <p:cNvSpPr/>
+          <p:nvPr/>
+        </p:nvSpPr>
+        <p:spPr>
+          <a:xfrm>
+            <a:off x="5541818" y="4576096"/>
+            <a:ext cx="1108363" cy="261827"/>
+          </a:xfrm>
+          <a:prstGeom prst="rect">
+            <a:avLst/>
+          </a:prstGeom>
+        </p:spPr>
+        <p:style>
+          <a:lnRef idx="2">
+            <a:schemeClr val="accent1">
+              <a:shade val="50000"/>
+            </a:schemeClr>
+          </a:lnRef>
+          <a:fillRef idx="1">
+            <a:schemeClr val="accent1"/>
+          </a:fillRef>
+          <a:effectRef idx="0">
+            <a:schemeClr val="accent1"/>
+          </a:effectRef>
+          <a:fontRef idx="minor">
+            <a:schemeClr val="lt1"/>
+          </a:fontRef>
+        </p:style>
+        <p:txBody>
+          <a:bodyPr rtlCol="0" anchor="ctr"/>
+          <a:lstStyle/>
+          <a:p>
+            <a:pPr algn="ctr"/>
+            <a:r>
+              <a:rPr lang="en-CA" sz="1000" dirty="0"/>
+              <a:t>I2C Master</a:t>
+            </a:r>
+          </a:p>
+        </p:txBody>
+      </p:sp>
+      <p:sp>
+        <p:nvSpPr>
+          <p:cNvPr id="20" name="Rectangle 19">
+            <a:extLst>
+              <a:ext uri="{FF2B5EF4-FFF2-40B4-BE49-F238E27FC236}">
+                <a16:creationId xmlns:a16="http://schemas.microsoft.com/office/drawing/2014/main" id="{4550A29B-3150-4CD6-8D41-D2CAED194F4F}"/>
+              </a:ext>
+            </a:extLst>
+          </p:cNvPr>
+          <p:cNvSpPr/>
+          <p:nvPr/>
+        </p:nvSpPr>
+        <p:spPr>
+          <a:xfrm>
+            <a:off x="6781504" y="4576096"/>
+            <a:ext cx="449655" cy="261827"/>
+          </a:xfrm>
+          <a:prstGeom prst="rect">
+            <a:avLst/>
+          </a:prstGeom>
+        </p:spPr>
+        <p:style>
+          <a:lnRef idx="2">
+            <a:schemeClr val="accent1">
+              <a:shade val="50000"/>
+            </a:schemeClr>
+          </a:lnRef>
+          <a:fillRef idx="1">
+            <a:schemeClr val="accent1"/>
+          </a:fillRef>
+          <a:effectRef idx="0">
+            <a:schemeClr val="accent1"/>
+          </a:effectRef>
+          <a:fontRef idx="minor">
+            <a:schemeClr val="lt1"/>
+          </a:fontRef>
+        </p:style>
+        <p:txBody>
+          <a:bodyPr rtlCol="0" anchor="ctr"/>
+          <a:lstStyle/>
+          <a:p>
+            <a:pPr algn="ctr"/>
+            <a:r>
+              <a:rPr lang="en-CA" sz="1000" dirty="0"/>
+              <a:t>RTC</a:t>
+            </a:r>
+          </a:p>
+        </p:txBody>
+      </p:sp>
+      <p:sp>
+        <p:nvSpPr>
+          <p:cNvPr id="21" name="Rectangle 20">
+            <a:extLst>
+              <a:ext uri="{FF2B5EF4-FFF2-40B4-BE49-F238E27FC236}">
+                <a16:creationId xmlns:a16="http://schemas.microsoft.com/office/drawing/2014/main" id="{5EA90438-BE8F-419B-BF78-2330E10B2621}"/>
+              </a:ext>
+            </a:extLst>
+          </p:cNvPr>
+          <p:cNvSpPr/>
+          <p:nvPr/>
+        </p:nvSpPr>
+        <p:spPr>
+          <a:xfrm>
+            <a:off x="5541818" y="4910351"/>
+            <a:ext cx="1108363" cy="261827"/>
+          </a:xfrm>
+          <a:prstGeom prst="rect">
+            <a:avLst/>
+          </a:prstGeom>
+        </p:spPr>
+        <p:style>
+          <a:lnRef idx="2">
+            <a:schemeClr val="accent1">
+              <a:shade val="50000"/>
+            </a:schemeClr>
+          </a:lnRef>
+          <a:fillRef idx="1">
+            <a:schemeClr val="accent1"/>
+          </a:fillRef>
+          <a:effectRef idx="0">
+            <a:schemeClr val="accent1"/>
+          </a:effectRef>
+          <a:fontRef idx="minor">
+            <a:schemeClr val="lt1"/>
+          </a:fontRef>
+        </p:style>
+        <p:txBody>
+          <a:bodyPr rtlCol="0" anchor="ctr"/>
+          <a:lstStyle/>
+          <a:p>
+            <a:pPr algn="ctr"/>
+            <a:r>
+              <a:rPr lang="en-CA" sz="1000" dirty="0"/>
+              <a:t>SPI Master</a:t>
+            </a:r>
+          </a:p>
+        </p:txBody>
+      </p:sp>
+      <p:sp>
+        <p:nvSpPr>
+          <p:cNvPr id="22" name="Rectangle 21">
+            <a:extLst>
+              <a:ext uri="{FF2B5EF4-FFF2-40B4-BE49-F238E27FC236}">
+                <a16:creationId xmlns:a16="http://schemas.microsoft.com/office/drawing/2014/main" id="{359D7D61-66D4-4B21-8B83-9735C6D31D6C}"/>
+              </a:ext>
+            </a:extLst>
+          </p:cNvPr>
+          <p:cNvSpPr/>
+          <p:nvPr/>
+        </p:nvSpPr>
+        <p:spPr>
+          <a:xfrm>
+            <a:off x="5541818" y="5236245"/>
+            <a:ext cx="1108363" cy="261827"/>
+          </a:xfrm>
+          <a:prstGeom prst="rect">
+            <a:avLst/>
+          </a:prstGeom>
+        </p:spPr>
+        <p:style>
+          <a:lnRef idx="2">
+            <a:schemeClr val="accent1">
+              <a:shade val="50000"/>
+            </a:schemeClr>
+          </a:lnRef>
+          <a:fillRef idx="1">
+            <a:schemeClr val="accent1"/>
+          </a:fillRef>
+          <a:effectRef idx="0">
+            <a:schemeClr val="accent1"/>
+          </a:effectRef>
+          <a:fontRef idx="minor">
+            <a:schemeClr val="lt1"/>
+          </a:fontRef>
+        </p:style>
+        <p:txBody>
+          <a:bodyPr rtlCol="0" anchor="ctr"/>
+          <a:lstStyle/>
+          <a:p>
+            <a:pPr algn="ctr"/>
+            <a:r>
+              <a:rPr lang="en-CA" sz="1000" dirty="0"/>
+              <a:t>SDC Controller</a:t>
+            </a:r>
+          </a:p>
+        </p:txBody>
+      </p:sp>
+      <p:sp>
+        <p:nvSpPr>
+          <p:cNvPr id="23" name="Rectangle 22">
+            <a:extLst>
+              <a:ext uri="{FF2B5EF4-FFF2-40B4-BE49-F238E27FC236}">
+                <a16:creationId xmlns:a16="http://schemas.microsoft.com/office/drawing/2014/main" id="{F92B4DE2-A61C-4197-9530-A94BD54690D0}"/>
+              </a:ext>
+            </a:extLst>
+          </p:cNvPr>
+          <p:cNvSpPr/>
+          <p:nvPr/>
+        </p:nvSpPr>
+        <p:spPr>
+          <a:xfrm>
+            <a:off x="5541817" y="5548006"/>
+            <a:ext cx="1108363" cy="261827"/>
+          </a:xfrm>
+          <a:prstGeom prst="rect">
+            <a:avLst/>
+          </a:prstGeom>
+        </p:spPr>
+        <p:style>
+          <a:lnRef idx="2">
+            <a:schemeClr val="accent1">
+              <a:shade val="50000"/>
+            </a:schemeClr>
+          </a:lnRef>
+          <a:fillRef idx="1">
+            <a:schemeClr val="accent1"/>
+          </a:fillRef>
+          <a:effectRef idx="0">
+            <a:schemeClr val="accent1"/>
+          </a:effectRef>
+          <a:fontRef idx="minor">
+            <a:schemeClr val="lt1"/>
+          </a:fontRef>
+        </p:style>
+        <p:txBody>
+          <a:bodyPr rtlCol="0" anchor="ctr"/>
+          <a:lstStyle/>
+          <a:p>
+            <a:pPr algn="ctr"/>
+            <a:r>
+              <a:rPr lang="en-CA" sz="1000" dirty="0"/>
+              <a:t>PTI</a:t>
+            </a:r>
+          </a:p>
+        </p:txBody>
+      </p:sp>
+      <p:cxnSp>
+        <p:nvCxnSpPr>
+          <p:cNvPr id="27" name="Straight Connector 26">
+            <a:extLst>
+              <a:ext uri="{FF2B5EF4-FFF2-40B4-BE49-F238E27FC236}">
+                <a16:creationId xmlns:a16="http://schemas.microsoft.com/office/drawing/2014/main" id="{97819877-8350-485E-A78B-5718DDCE203A}"/>
+              </a:ext>
+            </a:extLst>
+          </p:cNvPr>
+          <p:cNvCxnSpPr>
+            <a:stCxn id="19" idx="3"/>
+            <a:endCxn id="20" idx="1"/>
+          </p:cNvCxnSpPr>
+          <p:nvPr/>
+        </p:nvCxnSpPr>
+        <p:spPr>
+          <a:xfrm>
+            <a:off x="6650181" y="4707010"/>
+            <a:ext cx="131323" cy="0"/>
+          </a:xfrm>
+          <a:prstGeom prst="line">
+            <a:avLst/>
+          </a:prstGeom>
+        </p:spPr>
+        <p:style>
+          <a:lnRef idx="1">
+            <a:schemeClr val="accent1"/>
+          </a:lnRef>
+          <a:fillRef idx="0">
+            <a:schemeClr val="accent1"/>
+          </a:fillRef>
+          <a:effectRef idx="0">
+            <a:schemeClr val="accent1"/>
+          </a:effectRef>
+          <a:fontRef idx="minor">
+            <a:schemeClr val="tx1"/>
+          </a:fontRef>
+        </p:style>
+      </p:cxnSp>
+      <p:sp>
+        <p:nvSpPr>
+          <p:cNvPr id="28" name="Rectangle 27">
+            <a:extLst>
+              <a:ext uri="{FF2B5EF4-FFF2-40B4-BE49-F238E27FC236}">
+                <a16:creationId xmlns:a16="http://schemas.microsoft.com/office/drawing/2014/main" id="{6B389DCF-16C3-4546-896B-AE66AA9D318A}"/>
+              </a:ext>
+            </a:extLst>
+          </p:cNvPr>
+          <p:cNvSpPr/>
+          <p:nvPr/>
+        </p:nvSpPr>
+        <p:spPr>
+          <a:xfrm>
+            <a:off x="4812753" y="2653703"/>
+            <a:ext cx="461727" cy="576121"/>
+          </a:xfrm>
+          <a:prstGeom prst="rect">
+            <a:avLst/>
+          </a:prstGeom>
+        </p:spPr>
+        <p:style>
+          <a:lnRef idx="2">
+            <a:schemeClr val="accent1">
+              <a:shade val="50000"/>
+            </a:schemeClr>
+          </a:lnRef>
+          <a:fillRef idx="1">
+            <a:schemeClr val="accent1"/>
+          </a:fillRef>
+          <a:effectRef idx="0">
+            <a:schemeClr val="accent1"/>
+          </a:effectRef>
+          <a:fontRef idx="minor">
+            <a:schemeClr val="lt1"/>
+          </a:fontRef>
+        </p:style>
+        <p:txBody>
+          <a:bodyPr rtlCol="0" anchor="ctr"/>
+          <a:lstStyle/>
+          <a:p>
+            <a:pPr algn="ctr"/>
+            <a:r>
+              <a:rPr lang="en-CA" sz="1000" dirty="0"/>
+              <a:t>Reg. Input Mux</a:t>
+            </a:r>
+          </a:p>
+        </p:txBody>
+      </p:sp>
+      <p:sp>
+        <p:nvSpPr>
+          <p:cNvPr id="29" name="Rectangle 28">
+            <a:extLst>
+              <a:ext uri="{FF2B5EF4-FFF2-40B4-BE49-F238E27FC236}">
+                <a16:creationId xmlns:a16="http://schemas.microsoft.com/office/drawing/2014/main" id="{EA2265B8-8D18-44EF-9BFF-21E3142CDCDB}"/>
+              </a:ext>
+            </a:extLst>
+          </p:cNvPr>
+          <p:cNvSpPr/>
+          <p:nvPr/>
+        </p:nvSpPr>
+        <p:spPr>
+          <a:xfrm>
+            <a:off x="4812752" y="3900818"/>
+            <a:ext cx="461727" cy="543523"/>
+          </a:xfrm>
+          <a:prstGeom prst="rect">
+            <a:avLst/>
+          </a:prstGeom>
+        </p:spPr>
+        <p:style>
+          <a:lnRef idx="2">
+            <a:schemeClr val="accent1">
+              <a:shade val="50000"/>
+            </a:schemeClr>
+          </a:lnRef>
+          <a:fillRef idx="1">
+            <a:schemeClr val="accent1"/>
+          </a:fillRef>
+          <a:effectRef idx="0">
+            <a:schemeClr val="accent1"/>
+          </a:effectRef>
+          <a:fontRef idx="minor">
+            <a:schemeClr val="lt1"/>
+          </a:fontRef>
+        </p:style>
+        <p:txBody>
+          <a:bodyPr rtlCol="0" anchor="ctr"/>
+          <a:lstStyle/>
+          <a:p>
+            <a:pPr algn="ctr"/>
+            <a:r>
+              <a:rPr lang="en-CA" sz="1000" dirty="0"/>
+              <a:t>Reg. Input Mux</a:t>
+            </a:r>
+          </a:p>
+        </p:txBody>
+      </p:sp>
+      <p:sp>
+        <p:nvSpPr>
+          <p:cNvPr id="30" name="Rectangle 29">
+            <a:extLst>
+              <a:ext uri="{FF2B5EF4-FFF2-40B4-BE49-F238E27FC236}">
+                <a16:creationId xmlns:a16="http://schemas.microsoft.com/office/drawing/2014/main" id="{26ECA9EF-8265-47E4-A73C-F1EB267CA941}"/>
+              </a:ext>
+            </a:extLst>
+          </p:cNvPr>
+          <p:cNvSpPr/>
+          <p:nvPr/>
+        </p:nvSpPr>
+        <p:spPr>
+          <a:xfrm>
+            <a:off x="4812752" y="5115335"/>
+            <a:ext cx="461727" cy="694498"/>
+          </a:xfrm>
+          <a:prstGeom prst="rect">
+            <a:avLst/>
+          </a:prstGeom>
+        </p:spPr>
+        <p:style>
+          <a:lnRef idx="2">
+            <a:schemeClr val="accent1">
+              <a:shade val="50000"/>
+            </a:schemeClr>
+          </a:lnRef>
+          <a:fillRef idx="1">
+            <a:schemeClr val="accent1"/>
+          </a:fillRef>
+          <a:effectRef idx="0">
+            <a:schemeClr val="accent1"/>
+          </a:effectRef>
+          <a:fontRef idx="minor">
+            <a:schemeClr val="lt1"/>
+          </a:fontRef>
+        </p:style>
+        <p:txBody>
+          <a:bodyPr rtlCol="0" anchor="ctr"/>
+          <a:lstStyle/>
+          <a:p>
+            <a:pPr algn="ctr"/>
+            <a:r>
+              <a:rPr lang="en-CA" sz="1000" dirty="0"/>
+              <a:t>Reg. Input Mux</a:t>
+            </a:r>
+          </a:p>
+        </p:txBody>
+      </p:sp>
+      <p:cxnSp>
+        <p:nvCxnSpPr>
+          <p:cNvPr id="32" name="Straight Arrow Connector 31">
+            <a:extLst>
+              <a:ext uri="{FF2B5EF4-FFF2-40B4-BE49-F238E27FC236}">
+                <a16:creationId xmlns:a16="http://schemas.microsoft.com/office/drawing/2014/main" id="{63BC5905-93BF-42F0-B5A2-3F51845F2BF8}"/>
+              </a:ext>
+            </a:extLst>
+          </p:cNvPr>
+          <p:cNvCxnSpPr>
+            <a:stCxn id="7" idx="1"/>
+          </p:cNvCxnSpPr>
+          <p:nvPr/>
+        </p:nvCxnSpPr>
+        <p:spPr>
+          <a:xfrm flipH="1">
+            <a:off x="3051018" y="2684102"/>
+            <a:ext cx="620030" cy="962247"/>
+          </a:xfrm>
+          <a:prstGeom prst="straightConnector1">
+            <a:avLst/>
+          </a:prstGeom>
+          <a:ln>
+            <a:tailEnd type="triangle"/>
+          </a:ln>
+        </p:spPr>
+        <p:style>
+          <a:lnRef idx="1">
+            <a:schemeClr val="accent1"/>
+          </a:lnRef>
+          <a:fillRef idx="0">
+            <a:schemeClr val="accent1"/>
+          </a:fillRef>
+          <a:effectRef idx="0">
+            <a:schemeClr val="accent1"/>
+          </a:effectRef>
+          <a:fontRef idx="minor">
+            <a:schemeClr val="tx1"/>
+          </a:fontRef>
+        </p:style>
+      </p:cxnSp>
+      <p:cxnSp>
+        <p:nvCxnSpPr>
+          <p:cNvPr id="34" name="Straight Arrow Connector 33">
+            <a:extLst>
+              <a:ext uri="{FF2B5EF4-FFF2-40B4-BE49-F238E27FC236}">
+                <a16:creationId xmlns:a16="http://schemas.microsoft.com/office/drawing/2014/main" id="{ACB0ADEE-A32B-4CBE-B4BB-478B033DACCE}"/>
+              </a:ext>
+            </a:extLst>
+          </p:cNvPr>
+          <p:cNvCxnSpPr>
+            <a:stCxn id="9" idx="1"/>
+            <a:endCxn id="5" idx="3"/>
+          </p:cNvCxnSpPr>
+          <p:nvPr/>
+        </p:nvCxnSpPr>
+        <p:spPr>
+          <a:xfrm flipH="1" flipV="1">
+            <a:off x="3040863" y="3815338"/>
+            <a:ext cx="630185" cy="83282"/>
+          </a:xfrm>
+          <a:prstGeom prst="straightConnector1">
+            <a:avLst/>
+          </a:prstGeom>
+          <a:ln>
+            <a:tailEnd type="triangle"/>
+          </a:ln>
+        </p:spPr>
+        <p:style>
+          <a:lnRef idx="1">
+            <a:schemeClr val="accent1"/>
+          </a:lnRef>
+          <a:fillRef idx="0">
+            <a:schemeClr val="accent1"/>
+          </a:fillRef>
+          <a:effectRef idx="0">
+            <a:schemeClr val="accent1"/>
+          </a:effectRef>
+          <a:fontRef idx="minor">
+            <a:schemeClr val="tx1"/>
+          </a:fontRef>
+        </p:style>
+      </p:cxnSp>
+      <p:cxnSp>
+        <p:nvCxnSpPr>
+          <p:cNvPr id="36" name="Straight Arrow Connector 35">
+            <a:extLst>
+              <a:ext uri="{FF2B5EF4-FFF2-40B4-BE49-F238E27FC236}">
+                <a16:creationId xmlns:a16="http://schemas.microsoft.com/office/drawing/2014/main" id="{51228BD2-9DAC-4E19-BD3F-7ED89ABD37D8}"/>
+              </a:ext>
+            </a:extLst>
+          </p:cNvPr>
+          <p:cNvCxnSpPr>
+            <a:stCxn id="10" idx="1"/>
+          </p:cNvCxnSpPr>
+          <p:nvPr/>
+        </p:nvCxnSpPr>
+        <p:spPr>
+          <a:xfrm flipH="1" flipV="1">
+            <a:off x="3051018" y="4001057"/>
+            <a:ext cx="620029" cy="1198696"/>
+          </a:xfrm>
+          <a:prstGeom prst="straightConnector1">
+            <a:avLst/>
+          </a:prstGeom>
+          <a:ln>
+            <a:tailEnd type="triangle"/>
+          </a:ln>
+        </p:spPr>
+        <p:style>
+          <a:lnRef idx="1">
+            <a:schemeClr val="accent1"/>
+          </a:lnRef>
+          <a:fillRef idx="0">
+            <a:schemeClr val="accent1"/>
+          </a:fillRef>
+          <a:effectRef idx="0">
+            <a:schemeClr val="accent1"/>
+          </a:effectRef>
+          <a:fontRef idx="minor">
+            <a:schemeClr val="tx1"/>
+          </a:fontRef>
+        </p:style>
+      </p:cxnSp>
+      <p:cxnSp>
+        <p:nvCxnSpPr>
+          <p:cNvPr id="38" name="Straight Arrow Connector 37">
+            <a:extLst>
+              <a:ext uri="{FF2B5EF4-FFF2-40B4-BE49-F238E27FC236}">
+                <a16:creationId xmlns:a16="http://schemas.microsoft.com/office/drawing/2014/main" id="{5A23C15C-BE09-40FA-A226-2BAD8DF7A577}"/>
+              </a:ext>
+            </a:extLst>
+          </p:cNvPr>
+          <p:cNvCxnSpPr>
+            <a:cxnSpLocks/>
+            <a:stCxn id="28" idx="1"/>
+          </p:cNvCxnSpPr>
+          <p:nvPr/>
+        </p:nvCxnSpPr>
+        <p:spPr>
+          <a:xfrm flipH="1">
+            <a:off x="4585446" y="2941764"/>
+            <a:ext cx="227307" cy="15418"/>
+          </a:xfrm>
+          <a:prstGeom prst="straightConnector1">
+            <a:avLst/>
+          </a:prstGeom>
+          <a:ln>
+            <a:tailEnd type="triangle"/>
+          </a:ln>
+        </p:spPr>
+        <p:style>
+          <a:lnRef idx="1">
+            <a:schemeClr val="accent1"/>
+          </a:lnRef>
+          <a:fillRef idx="0">
+            <a:schemeClr val="accent1"/>
+          </a:fillRef>
+          <a:effectRef idx="0">
+            <a:schemeClr val="accent1"/>
+          </a:effectRef>
+          <a:fontRef idx="minor">
+            <a:schemeClr val="tx1"/>
+          </a:fontRef>
+        </p:style>
+      </p:cxnSp>
+      <p:cxnSp>
+        <p:nvCxnSpPr>
+          <p:cNvPr id="40" name="Straight Arrow Connector 39">
+            <a:extLst>
+              <a:ext uri="{FF2B5EF4-FFF2-40B4-BE49-F238E27FC236}">
+                <a16:creationId xmlns:a16="http://schemas.microsoft.com/office/drawing/2014/main" id="{3DB0F956-F933-4B75-B4D2-5D10FC49F458}"/>
+              </a:ext>
+            </a:extLst>
+          </p:cNvPr>
+          <p:cNvCxnSpPr>
+            <a:stCxn id="29" idx="1"/>
+          </p:cNvCxnSpPr>
+          <p:nvPr/>
+        </p:nvCxnSpPr>
+        <p:spPr>
+          <a:xfrm flipH="1" flipV="1">
+            <a:off x="4604166" y="4164655"/>
+            <a:ext cx="208586" cy="7925"/>
+          </a:xfrm>
+          <a:prstGeom prst="straightConnector1">
+            <a:avLst/>
+          </a:prstGeom>
+          <a:ln>
+            <a:tailEnd type="triangle"/>
+          </a:ln>
+        </p:spPr>
+        <p:style>
+          <a:lnRef idx="1">
+            <a:schemeClr val="accent1"/>
+          </a:lnRef>
+          <a:fillRef idx="0">
+            <a:schemeClr val="accent1"/>
+          </a:fillRef>
+          <a:effectRef idx="0">
+            <a:schemeClr val="accent1"/>
+          </a:effectRef>
+          <a:fontRef idx="minor">
+            <a:schemeClr val="tx1"/>
+          </a:fontRef>
+        </p:style>
+      </p:cxnSp>
+      <p:cxnSp>
+        <p:nvCxnSpPr>
+          <p:cNvPr id="42" name="Straight Arrow Connector 41">
+            <a:extLst>
+              <a:ext uri="{FF2B5EF4-FFF2-40B4-BE49-F238E27FC236}">
+                <a16:creationId xmlns:a16="http://schemas.microsoft.com/office/drawing/2014/main" id="{6CBDF6BA-9F47-4963-B409-F69EE36D1F6D}"/>
+              </a:ext>
+            </a:extLst>
+          </p:cNvPr>
+          <p:cNvCxnSpPr>
+            <a:stCxn id="30" idx="1"/>
+          </p:cNvCxnSpPr>
+          <p:nvPr/>
+        </p:nvCxnSpPr>
+        <p:spPr>
+          <a:xfrm flipH="1">
+            <a:off x="4594807" y="5462584"/>
+            <a:ext cx="217945" cy="0"/>
+          </a:xfrm>
+          <a:prstGeom prst="straightConnector1">
+            <a:avLst/>
+          </a:prstGeom>
+          <a:ln>
+            <a:tailEnd type="triangle"/>
+          </a:ln>
+        </p:spPr>
+        <p:style>
+          <a:lnRef idx="1">
+            <a:schemeClr val="accent1"/>
+          </a:lnRef>
+          <a:fillRef idx="0">
+            <a:schemeClr val="accent1"/>
+          </a:fillRef>
+          <a:effectRef idx="0">
+            <a:schemeClr val="accent1"/>
+          </a:effectRef>
+          <a:fontRef idx="minor">
+            <a:schemeClr val="tx1"/>
+          </a:fontRef>
+        </p:style>
+      </p:cxnSp>
+      <p:cxnSp>
+        <p:nvCxnSpPr>
+          <p:cNvPr id="44" name="Straight Arrow Connector 43">
+            <a:extLst>
+              <a:ext uri="{FF2B5EF4-FFF2-40B4-BE49-F238E27FC236}">
+                <a16:creationId xmlns:a16="http://schemas.microsoft.com/office/drawing/2014/main" id="{0E45EDFE-B7F6-4E56-85BD-B01CC0EB8337}"/>
+              </a:ext>
+            </a:extLst>
+          </p:cNvPr>
+          <p:cNvCxnSpPr>
+            <a:stCxn id="6" idx="1"/>
+          </p:cNvCxnSpPr>
+          <p:nvPr/>
+        </p:nvCxnSpPr>
+        <p:spPr>
+          <a:xfrm flipH="1">
+            <a:off x="2969537" y="1859353"/>
+            <a:ext cx="701510" cy="1616603"/>
+          </a:xfrm>
+          <a:prstGeom prst="straightConnector1">
+            <a:avLst/>
+          </a:prstGeom>
+          <a:ln>
+            <a:tailEnd type="triangle"/>
+          </a:ln>
+        </p:spPr>
+        <p:style>
+          <a:lnRef idx="1">
+            <a:schemeClr val="accent1"/>
+          </a:lnRef>
+          <a:fillRef idx="0">
+            <a:schemeClr val="accent1"/>
+          </a:fillRef>
+          <a:effectRef idx="0">
+            <a:schemeClr val="accent1"/>
+          </a:effectRef>
+          <a:fontRef idx="minor">
+            <a:schemeClr val="tx1"/>
+          </a:fontRef>
+        </p:style>
+      </p:cxnSp>
+      <p:cxnSp>
+        <p:nvCxnSpPr>
+          <p:cNvPr id="46" name="Straight Arrow Connector 45">
+            <a:extLst>
+              <a:ext uri="{FF2B5EF4-FFF2-40B4-BE49-F238E27FC236}">
+                <a16:creationId xmlns:a16="http://schemas.microsoft.com/office/drawing/2014/main" id="{FB1C4377-C89A-44AA-AC80-05AC01CCB1AA}"/>
+              </a:ext>
+            </a:extLst>
+          </p:cNvPr>
+          <p:cNvCxnSpPr>
+            <a:stCxn id="12" idx="1"/>
+          </p:cNvCxnSpPr>
+          <p:nvPr/>
+        </p:nvCxnSpPr>
+        <p:spPr>
+          <a:xfrm flipH="1">
+            <a:off x="5274479" y="2287648"/>
+            <a:ext cx="267345" cy="366055"/>
+          </a:xfrm>
+          <a:prstGeom prst="straightConnector1">
+            <a:avLst/>
+          </a:prstGeom>
+          <a:ln>
+            <a:tailEnd type="triangle"/>
+          </a:ln>
+        </p:spPr>
+        <p:style>
+          <a:lnRef idx="1">
+            <a:schemeClr val="accent1"/>
+          </a:lnRef>
+          <a:fillRef idx="0">
+            <a:schemeClr val="accent1"/>
+          </a:fillRef>
+          <a:effectRef idx="0">
+            <a:schemeClr val="accent1"/>
+          </a:effectRef>
+          <a:fontRef idx="minor">
+            <a:schemeClr val="tx1"/>
+          </a:fontRef>
+        </p:style>
+      </p:cxnSp>
+      <p:cxnSp>
+        <p:nvCxnSpPr>
+          <p:cNvPr id="48" name="Straight Arrow Connector 47">
+            <a:extLst>
+              <a:ext uri="{FF2B5EF4-FFF2-40B4-BE49-F238E27FC236}">
+                <a16:creationId xmlns:a16="http://schemas.microsoft.com/office/drawing/2014/main" id="{CAD62575-229A-4F0B-8315-D08FEE1BAAC9}"/>
+              </a:ext>
+            </a:extLst>
+          </p:cNvPr>
+          <p:cNvCxnSpPr>
+            <a:stCxn id="13" idx="1"/>
+          </p:cNvCxnSpPr>
+          <p:nvPr/>
+        </p:nvCxnSpPr>
+        <p:spPr>
+          <a:xfrm flipH="1">
+            <a:off x="5274479" y="2680368"/>
+            <a:ext cx="267344" cy="122599"/>
+          </a:xfrm>
+          <a:prstGeom prst="straightConnector1">
+            <a:avLst/>
+          </a:prstGeom>
+          <a:ln>
+            <a:tailEnd type="triangle"/>
+          </a:ln>
+        </p:spPr>
+        <p:style>
+          <a:lnRef idx="1">
+            <a:schemeClr val="accent1"/>
+          </a:lnRef>
+          <a:fillRef idx="0">
+            <a:schemeClr val="accent1"/>
+          </a:fillRef>
+          <a:effectRef idx="0">
+            <a:schemeClr val="accent1"/>
+          </a:effectRef>
+          <a:fontRef idx="minor">
+            <a:schemeClr val="tx1"/>
+          </a:fontRef>
+        </p:style>
+      </p:cxnSp>
+      <p:cxnSp>
+        <p:nvCxnSpPr>
+          <p:cNvPr id="50" name="Straight Arrow Connector 49">
+            <a:extLst>
+              <a:ext uri="{FF2B5EF4-FFF2-40B4-BE49-F238E27FC236}">
+                <a16:creationId xmlns:a16="http://schemas.microsoft.com/office/drawing/2014/main" id="{012114E0-0DF1-4960-8EB1-1FE01AEF4E80}"/>
+              </a:ext>
+            </a:extLst>
+          </p:cNvPr>
+          <p:cNvCxnSpPr>
+            <a:stCxn id="14" idx="1"/>
+            <a:endCxn id="28" idx="3"/>
+          </p:cNvCxnSpPr>
+          <p:nvPr/>
+        </p:nvCxnSpPr>
+        <p:spPr>
+          <a:xfrm flipH="1" flipV="1">
+            <a:off x="5274480" y="2941764"/>
+            <a:ext cx="267342" cy="117198"/>
+          </a:xfrm>
+          <a:prstGeom prst="straightConnector1">
+            <a:avLst/>
+          </a:prstGeom>
+          <a:ln>
+            <a:tailEnd type="triangle"/>
+          </a:ln>
+        </p:spPr>
+        <p:style>
+          <a:lnRef idx="1">
+            <a:schemeClr val="accent1"/>
+          </a:lnRef>
+          <a:fillRef idx="0">
+            <a:schemeClr val="accent1"/>
+          </a:fillRef>
+          <a:effectRef idx="0">
+            <a:schemeClr val="accent1"/>
+          </a:effectRef>
+          <a:fontRef idx="minor">
+            <a:schemeClr val="tx1"/>
+          </a:fontRef>
+        </p:style>
+      </p:cxnSp>
+      <p:cxnSp>
+        <p:nvCxnSpPr>
+          <p:cNvPr id="52" name="Straight Arrow Connector 51">
+            <a:extLst>
+              <a:ext uri="{FF2B5EF4-FFF2-40B4-BE49-F238E27FC236}">
+                <a16:creationId xmlns:a16="http://schemas.microsoft.com/office/drawing/2014/main" id="{1013AF39-45F4-4302-811A-98CD13C83049}"/>
+              </a:ext>
+            </a:extLst>
+          </p:cNvPr>
+          <p:cNvCxnSpPr>
+            <a:stCxn id="15" idx="1"/>
+            <a:endCxn id="29" idx="0"/>
+          </p:cNvCxnSpPr>
+          <p:nvPr/>
+        </p:nvCxnSpPr>
+        <p:spPr>
+          <a:xfrm flipH="1">
+            <a:off x="5043616" y="3417553"/>
+            <a:ext cx="498205" cy="483265"/>
+          </a:xfrm>
+          <a:prstGeom prst="straightConnector1">
+            <a:avLst/>
+          </a:prstGeom>
+          <a:ln>
+            <a:tailEnd type="triangle"/>
+          </a:ln>
+        </p:spPr>
+        <p:style>
+          <a:lnRef idx="1">
+            <a:schemeClr val="accent1"/>
+          </a:lnRef>
+          <a:fillRef idx="0">
+            <a:schemeClr val="accent1"/>
+          </a:fillRef>
+          <a:effectRef idx="0">
+            <a:schemeClr val="accent1"/>
+          </a:effectRef>
+          <a:fontRef idx="minor">
+            <a:schemeClr val="tx1"/>
+          </a:fontRef>
+        </p:style>
+      </p:cxnSp>
+      <p:cxnSp>
+        <p:nvCxnSpPr>
+          <p:cNvPr id="54" name="Straight Arrow Connector 53">
+            <a:extLst>
+              <a:ext uri="{FF2B5EF4-FFF2-40B4-BE49-F238E27FC236}">
+                <a16:creationId xmlns:a16="http://schemas.microsoft.com/office/drawing/2014/main" id="{C686AFCB-06FA-4EA6-BFCB-E88CBB81050B}"/>
+              </a:ext>
+            </a:extLst>
+          </p:cNvPr>
+          <p:cNvCxnSpPr>
+            <a:stCxn id="16" idx="1"/>
+          </p:cNvCxnSpPr>
+          <p:nvPr/>
+        </p:nvCxnSpPr>
+        <p:spPr>
+          <a:xfrm flipH="1">
+            <a:off x="5274479" y="3646349"/>
+            <a:ext cx="267341" cy="275698"/>
+          </a:xfrm>
+          <a:prstGeom prst="straightConnector1">
+            <a:avLst/>
+          </a:prstGeom>
+          <a:ln>
+            <a:tailEnd type="triangle"/>
+          </a:ln>
+        </p:spPr>
+        <p:style>
+          <a:lnRef idx="1">
+            <a:schemeClr val="accent1"/>
+          </a:lnRef>
+          <a:fillRef idx="0">
+            <a:schemeClr val="accent1"/>
+          </a:fillRef>
+          <a:effectRef idx="0">
+            <a:schemeClr val="accent1"/>
+          </a:effectRef>
+          <a:fontRef idx="minor">
+            <a:schemeClr val="tx1"/>
+          </a:fontRef>
+        </p:style>
+      </p:cxnSp>
+      <p:cxnSp>
+        <p:nvCxnSpPr>
+          <p:cNvPr id="56" name="Straight Arrow Connector 55">
+            <a:extLst>
+              <a:ext uri="{FF2B5EF4-FFF2-40B4-BE49-F238E27FC236}">
+                <a16:creationId xmlns:a16="http://schemas.microsoft.com/office/drawing/2014/main" id="{A2B10985-BCA9-4F2D-96D8-823BE2F915FF}"/>
+              </a:ext>
+            </a:extLst>
+          </p:cNvPr>
+          <p:cNvCxnSpPr>
+            <a:stCxn id="17" idx="1"/>
+            <a:endCxn id="29" idx="3"/>
+          </p:cNvCxnSpPr>
+          <p:nvPr/>
+        </p:nvCxnSpPr>
+        <p:spPr>
+          <a:xfrm flipH="1">
+            <a:off x="5274479" y="3937742"/>
+            <a:ext cx="267341" cy="234838"/>
+          </a:xfrm>
+          <a:prstGeom prst="straightConnector1">
+            <a:avLst/>
+          </a:prstGeom>
+          <a:ln>
+            <a:tailEnd type="triangle"/>
+          </a:ln>
+        </p:spPr>
+        <p:style>
+          <a:lnRef idx="1">
+            <a:schemeClr val="accent1"/>
+          </a:lnRef>
+          <a:fillRef idx="0">
+            <a:schemeClr val="accent1"/>
+          </a:fillRef>
+          <a:effectRef idx="0">
+            <a:schemeClr val="accent1"/>
+          </a:effectRef>
+          <a:fontRef idx="minor">
+            <a:schemeClr val="tx1"/>
+          </a:fontRef>
+        </p:style>
+      </p:cxnSp>
+      <p:cxnSp>
+        <p:nvCxnSpPr>
+          <p:cNvPr id="58" name="Straight Arrow Connector 57">
+            <a:extLst>
+              <a:ext uri="{FF2B5EF4-FFF2-40B4-BE49-F238E27FC236}">
+                <a16:creationId xmlns:a16="http://schemas.microsoft.com/office/drawing/2014/main" id="{A933AB1E-4B53-4569-B305-E77C0375943E}"/>
+              </a:ext>
+            </a:extLst>
+          </p:cNvPr>
+          <p:cNvCxnSpPr>
+            <a:stCxn id="18" idx="1"/>
+          </p:cNvCxnSpPr>
+          <p:nvPr/>
+        </p:nvCxnSpPr>
+        <p:spPr>
+          <a:xfrm flipH="1">
+            <a:off x="5292718" y="4295569"/>
+            <a:ext cx="249101" cy="14736"/>
+          </a:xfrm>
+          <a:prstGeom prst="straightConnector1">
+            <a:avLst/>
+          </a:prstGeom>
+          <a:ln>
+            <a:tailEnd type="triangle"/>
+          </a:ln>
+        </p:spPr>
+        <p:style>
+          <a:lnRef idx="1">
+            <a:schemeClr val="accent1"/>
+          </a:lnRef>
+          <a:fillRef idx="0">
+            <a:schemeClr val="accent1"/>
+          </a:fillRef>
+          <a:effectRef idx="0">
+            <a:schemeClr val="accent1"/>
+          </a:effectRef>
+          <a:fontRef idx="minor">
+            <a:schemeClr val="tx1"/>
+          </a:fontRef>
+        </p:style>
+      </p:cxnSp>
+      <p:cxnSp>
+        <p:nvCxnSpPr>
+          <p:cNvPr id="60" name="Straight Arrow Connector 59">
+            <a:extLst>
+              <a:ext uri="{FF2B5EF4-FFF2-40B4-BE49-F238E27FC236}">
+                <a16:creationId xmlns:a16="http://schemas.microsoft.com/office/drawing/2014/main" id="{7AB6616B-7B68-47E0-8BFA-1AD8D0E046B6}"/>
+              </a:ext>
+            </a:extLst>
+          </p:cNvPr>
+          <p:cNvCxnSpPr>
+            <a:stCxn id="19" idx="1"/>
+          </p:cNvCxnSpPr>
+          <p:nvPr/>
+        </p:nvCxnSpPr>
+        <p:spPr>
+          <a:xfrm flipH="1">
+            <a:off x="5274479" y="4707010"/>
+            <a:ext cx="267339" cy="408325"/>
+          </a:xfrm>
+          <a:prstGeom prst="straightConnector1">
+            <a:avLst/>
+          </a:prstGeom>
+          <a:ln>
+            <a:tailEnd type="triangle"/>
+          </a:ln>
+        </p:spPr>
+        <p:style>
+          <a:lnRef idx="1">
+            <a:schemeClr val="accent1"/>
+          </a:lnRef>
+          <a:fillRef idx="0">
+            <a:schemeClr val="accent1"/>
+          </a:fillRef>
+          <a:effectRef idx="0">
+            <a:schemeClr val="accent1"/>
+          </a:effectRef>
+          <a:fontRef idx="minor">
+            <a:schemeClr val="tx1"/>
+          </a:fontRef>
+        </p:style>
+      </p:cxnSp>
+      <p:cxnSp>
+        <p:nvCxnSpPr>
+          <p:cNvPr id="62" name="Straight Arrow Connector 61">
+            <a:extLst>
+              <a:ext uri="{FF2B5EF4-FFF2-40B4-BE49-F238E27FC236}">
+                <a16:creationId xmlns:a16="http://schemas.microsoft.com/office/drawing/2014/main" id="{57EDAC53-AB3C-441F-A54A-4890829763DE}"/>
+              </a:ext>
+            </a:extLst>
+          </p:cNvPr>
+          <p:cNvCxnSpPr>
+            <a:stCxn id="21" idx="1"/>
+          </p:cNvCxnSpPr>
+          <p:nvPr/>
+        </p:nvCxnSpPr>
+        <p:spPr>
+          <a:xfrm flipH="1">
+            <a:off x="5292718" y="5041265"/>
+            <a:ext cx="249100" cy="252839"/>
+          </a:xfrm>
+          <a:prstGeom prst="straightConnector1">
+            <a:avLst/>
+          </a:prstGeom>
+          <a:ln>
+            <a:tailEnd type="triangle"/>
+          </a:ln>
+        </p:spPr>
+        <p:style>
+          <a:lnRef idx="1">
+            <a:schemeClr val="accent1"/>
+          </a:lnRef>
+          <a:fillRef idx="0">
+            <a:schemeClr val="accent1"/>
+          </a:fillRef>
+          <a:effectRef idx="0">
+            <a:schemeClr val="accent1"/>
+          </a:effectRef>
+          <a:fontRef idx="minor">
+            <a:schemeClr val="tx1"/>
+          </a:fontRef>
+        </p:style>
+      </p:cxnSp>
+      <p:cxnSp>
+        <p:nvCxnSpPr>
+          <p:cNvPr id="64" name="Straight Arrow Connector 63">
+            <a:extLst>
+              <a:ext uri="{FF2B5EF4-FFF2-40B4-BE49-F238E27FC236}">
+                <a16:creationId xmlns:a16="http://schemas.microsoft.com/office/drawing/2014/main" id="{BD26E193-CE81-4F22-9FC5-6EEF060997DE}"/>
+              </a:ext>
+            </a:extLst>
+          </p:cNvPr>
+          <p:cNvCxnSpPr>
+            <a:stCxn id="22" idx="1"/>
+            <a:endCxn id="30" idx="3"/>
+          </p:cNvCxnSpPr>
+          <p:nvPr/>
+        </p:nvCxnSpPr>
+        <p:spPr>
+          <a:xfrm flipH="1">
+            <a:off x="5274479" y="5367159"/>
+            <a:ext cx="267339" cy="95425"/>
+          </a:xfrm>
+          <a:prstGeom prst="straightConnector1">
+            <a:avLst/>
+          </a:prstGeom>
+          <a:ln>
+            <a:tailEnd type="triangle"/>
+          </a:ln>
+        </p:spPr>
+        <p:style>
+          <a:lnRef idx="1">
+            <a:schemeClr val="accent1"/>
+          </a:lnRef>
+          <a:fillRef idx="0">
+            <a:schemeClr val="accent1"/>
+          </a:fillRef>
+          <a:effectRef idx="0">
+            <a:schemeClr val="accent1"/>
+          </a:effectRef>
+          <a:fontRef idx="minor">
+            <a:schemeClr val="tx1"/>
+          </a:fontRef>
+        </p:style>
+      </p:cxnSp>
+      <p:cxnSp>
+        <p:nvCxnSpPr>
+          <p:cNvPr id="66" name="Straight Arrow Connector 65">
+            <a:extLst>
+              <a:ext uri="{FF2B5EF4-FFF2-40B4-BE49-F238E27FC236}">
+                <a16:creationId xmlns:a16="http://schemas.microsoft.com/office/drawing/2014/main" id="{0A100A8D-6508-4FC4-A5A2-946580161A46}"/>
+              </a:ext>
+            </a:extLst>
+          </p:cNvPr>
+          <p:cNvCxnSpPr>
+            <a:stCxn id="23" idx="1"/>
+          </p:cNvCxnSpPr>
+          <p:nvPr/>
+        </p:nvCxnSpPr>
+        <p:spPr>
+          <a:xfrm flipH="1" flipV="1">
+            <a:off x="5292718" y="5628359"/>
+            <a:ext cx="249099" cy="50561"/>
+          </a:xfrm>
+          <a:prstGeom prst="straightConnector1">
+            <a:avLst/>
+          </a:prstGeom>
+          <a:ln>
+            <a:tailEnd type="triangle"/>
+          </a:ln>
+        </p:spPr>
+        <p:style>
+          <a:lnRef idx="1">
+            <a:schemeClr val="accent1"/>
+          </a:lnRef>
+          <a:fillRef idx="0">
+            <a:schemeClr val="accent1"/>
+          </a:fillRef>
+          <a:effectRef idx="0">
+            <a:schemeClr val="accent1"/>
+          </a:effectRef>
+          <a:fontRef idx="minor">
+            <a:schemeClr val="tx1"/>
+          </a:fontRef>
+        </p:style>
+      </p:cxnSp>
+      <p:sp>
+        <p:nvSpPr>
+          <p:cNvPr id="67" name="Rectangle 66">
+            <a:extLst>
+              <a:ext uri="{FF2B5EF4-FFF2-40B4-BE49-F238E27FC236}">
+                <a16:creationId xmlns:a16="http://schemas.microsoft.com/office/drawing/2014/main" id="{DB7E7798-2340-45F5-89F5-609CF0FFD89D}"/>
+              </a:ext>
+            </a:extLst>
+          </p:cNvPr>
+          <p:cNvSpPr/>
+          <p:nvPr/>
+        </p:nvSpPr>
+        <p:spPr>
+          <a:xfrm>
+            <a:off x="8618684" y="2287648"/>
+            <a:ext cx="824181" cy="2700825"/>
+          </a:xfrm>
+          <a:prstGeom prst="rect">
+            <a:avLst/>
+          </a:prstGeom>
+        </p:spPr>
+        <p:style>
+          <a:lnRef idx="2">
+            <a:schemeClr val="accent1">
+              <a:shade val="50000"/>
+            </a:schemeClr>
+          </a:lnRef>
+          <a:fillRef idx="1">
+            <a:schemeClr val="accent1"/>
+          </a:fillRef>
+          <a:effectRef idx="0">
+            <a:schemeClr val="accent1"/>
+          </a:effectRef>
+          <a:fontRef idx="minor">
+            <a:schemeClr val="lt1"/>
+          </a:fontRef>
+        </p:style>
+        <p:txBody>
+          <a:bodyPr rtlCol="0" anchor="ctr"/>
+          <a:lstStyle/>
+          <a:p>
+            <a:pPr algn="ctr"/>
+            <a:r>
+              <a:rPr lang="en-CA" sz="1050" dirty="0"/>
+              <a:t>DRAM</a:t>
+            </a:r>
+          </a:p>
+          <a:p>
+            <a:pPr algn="ctr"/>
+            <a:r>
+              <a:rPr lang="en-CA" sz="1050" dirty="0"/>
+              <a:t>512 MB</a:t>
+            </a:r>
+          </a:p>
+        </p:txBody>
+      </p:sp>
+      <p:cxnSp>
+        <p:nvCxnSpPr>
+          <p:cNvPr id="69" name="Straight Connector 68">
+            <a:extLst>
+              <a:ext uri="{FF2B5EF4-FFF2-40B4-BE49-F238E27FC236}">
+                <a16:creationId xmlns:a16="http://schemas.microsoft.com/office/drawing/2014/main" id="{19048B1F-3B8B-4A48-8EFC-6A0B048314FC}"/>
+              </a:ext>
+            </a:extLst>
+          </p:cNvPr>
+          <p:cNvCxnSpPr>
+            <a:cxnSpLocks/>
+            <a:stCxn id="67" idx="0"/>
+          </p:cNvCxnSpPr>
+          <p:nvPr/>
+        </p:nvCxnSpPr>
+        <p:spPr>
+          <a:xfrm flipV="1">
+            <a:off x="9030775" y="1540834"/>
+            <a:ext cx="0" cy="746814"/>
+          </a:xfrm>
+          <a:prstGeom prst="line">
+            <a:avLst/>
+          </a:prstGeom>
+        </p:spPr>
+        <p:style>
+          <a:lnRef idx="1">
+            <a:schemeClr val="accent1"/>
+          </a:lnRef>
+          <a:fillRef idx="0">
+            <a:schemeClr val="accent1"/>
+          </a:fillRef>
+          <a:effectRef idx="0">
+            <a:schemeClr val="accent1"/>
+          </a:effectRef>
+          <a:fontRef idx="minor">
+            <a:schemeClr val="tx1"/>
+          </a:fontRef>
+        </p:style>
+      </p:cxnSp>
+      <p:cxnSp>
+        <p:nvCxnSpPr>
+          <p:cNvPr id="71" name="Straight Connector 70">
+            <a:extLst>
+              <a:ext uri="{FF2B5EF4-FFF2-40B4-BE49-F238E27FC236}">
+                <a16:creationId xmlns:a16="http://schemas.microsoft.com/office/drawing/2014/main" id="{98243CE8-85D7-4F70-9ACB-6DD02C30C77B}"/>
+              </a:ext>
+            </a:extLst>
+          </p:cNvPr>
+          <p:cNvCxnSpPr>
+            <a:cxnSpLocks/>
+          </p:cNvCxnSpPr>
+          <p:nvPr/>
+        </p:nvCxnSpPr>
+        <p:spPr>
+          <a:xfrm flipH="1">
+            <a:off x="2969539" y="1540834"/>
+            <a:ext cx="6061236" cy="0"/>
+          </a:xfrm>
+          <a:prstGeom prst="line">
+            <a:avLst/>
+          </a:prstGeom>
+        </p:spPr>
+        <p:style>
+          <a:lnRef idx="1">
+            <a:schemeClr val="accent1"/>
+          </a:lnRef>
+          <a:fillRef idx="0">
+            <a:schemeClr val="accent1"/>
+          </a:fillRef>
+          <a:effectRef idx="0">
+            <a:schemeClr val="accent1"/>
+          </a:effectRef>
+          <a:fontRef idx="minor">
+            <a:schemeClr val="tx1"/>
+          </a:fontRef>
+        </p:style>
+      </p:cxnSp>
+      <p:cxnSp>
+        <p:nvCxnSpPr>
+          <p:cNvPr id="73" name="Straight Arrow Connector 72">
+            <a:extLst>
+              <a:ext uri="{FF2B5EF4-FFF2-40B4-BE49-F238E27FC236}">
+                <a16:creationId xmlns:a16="http://schemas.microsoft.com/office/drawing/2014/main" id="{44475538-E964-4EA5-B879-FBBAB7811D5C}"/>
+              </a:ext>
+            </a:extLst>
+          </p:cNvPr>
+          <p:cNvCxnSpPr>
+            <a:endCxn id="5" idx="0"/>
+          </p:cNvCxnSpPr>
+          <p:nvPr/>
+        </p:nvCxnSpPr>
+        <p:spPr>
+          <a:xfrm flipH="1">
+            <a:off x="2810000" y="1568809"/>
+            <a:ext cx="159537" cy="1907147"/>
+          </a:xfrm>
+          <a:prstGeom prst="straightConnector1">
+            <a:avLst/>
+          </a:prstGeom>
+          <a:ln>
+            <a:tailEnd type="triangle"/>
+          </a:ln>
+        </p:spPr>
+        <p:style>
+          <a:lnRef idx="1">
+            <a:schemeClr val="accent1"/>
+          </a:lnRef>
+          <a:fillRef idx="0">
+            <a:schemeClr val="accent1"/>
+          </a:fillRef>
+          <a:effectRef idx="0">
+            <a:schemeClr val="accent1"/>
+          </a:effectRef>
+          <a:fontRef idx="minor">
+            <a:schemeClr val="tx1"/>
+          </a:fontRef>
+        </p:style>
+      </p:cxnSp>
+      <p:cxnSp>
+        <p:nvCxnSpPr>
+          <p:cNvPr id="77" name="Straight Arrow Connector 76">
+            <a:extLst>
+              <a:ext uri="{FF2B5EF4-FFF2-40B4-BE49-F238E27FC236}">
+                <a16:creationId xmlns:a16="http://schemas.microsoft.com/office/drawing/2014/main" id="{CAC799F8-7EF5-4CCE-8A75-8317AE86F474}"/>
+              </a:ext>
+            </a:extLst>
+          </p:cNvPr>
+          <p:cNvCxnSpPr>
+            <a:stCxn id="12" idx="3"/>
+          </p:cNvCxnSpPr>
+          <p:nvPr/>
+        </p:nvCxnSpPr>
+        <p:spPr>
+          <a:xfrm>
+            <a:off x="6650187" y="2287648"/>
+            <a:ext cx="1071532" cy="0"/>
+          </a:xfrm>
+          <a:prstGeom prst="straightConnector1">
+            <a:avLst/>
+          </a:prstGeom>
+          <a:ln>
+            <a:tailEnd type="triangle"/>
+          </a:ln>
+        </p:spPr>
+        <p:style>
+          <a:lnRef idx="1">
+            <a:schemeClr val="accent1"/>
+          </a:lnRef>
+          <a:fillRef idx="0">
+            <a:schemeClr val="accent1"/>
+          </a:fillRef>
+          <a:effectRef idx="0">
+            <a:schemeClr val="accent1"/>
+          </a:effectRef>
+          <a:fontRef idx="minor">
+            <a:schemeClr val="tx1"/>
+          </a:fontRef>
+        </p:style>
+      </p:cxnSp>
+      <p:sp>
+        <p:nvSpPr>
+          <p:cNvPr id="78" name="Rectangle 77">
+            <a:extLst>
+              <a:ext uri="{FF2B5EF4-FFF2-40B4-BE49-F238E27FC236}">
+                <a16:creationId xmlns:a16="http://schemas.microsoft.com/office/drawing/2014/main" id="{A0EB315D-A1F4-4CEF-AB96-BA63BFF1600B}"/>
+              </a:ext>
+            </a:extLst>
+          </p:cNvPr>
+          <p:cNvSpPr/>
+          <p:nvPr/>
+        </p:nvSpPr>
+        <p:spPr>
+          <a:xfrm>
+            <a:off x="7726754" y="1749033"/>
+            <a:ext cx="769340" cy="4078657"/>
+          </a:xfrm>
+          <a:prstGeom prst="rect">
+            <a:avLst/>
+          </a:prstGeom>
+        </p:spPr>
+        <p:style>
+          <a:lnRef idx="2">
+            <a:schemeClr val="accent1">
+              <a:shade val="50000"/>
+            </a:schemeClr>
+          </a:lnRef>
+          <a:fillRef idx="1">
+            <a:schemeClr val="accent1"/>
+          </a:fillRef>
+          <a:effectRef idx="0">
+            <a:schemeClr val="accent1"/>
+          </a:effectRef>
+          <a:fontRef idx="minor">
+            <a:schemeClr val="lt1"/>
+          </a:fontRef>
+        </p:style>
+        <p:txBody>
+          <a:bodyPr rtlCol="0" anchor="ctr"/>
+          <a:lstStyle/>
+          <a:p>
+            <a:pPr algn="ctr"/>
+            <a:r>
+              <a:rPr lang="en-CA" sz="1400" dirty="0"/>
+              <a:t>MPMC</a:t>
+            </a:r>
+          </a:p>
+        </p:txBody>
+      </p:sp>
+      <p:cxnSp>
+        <p:nvCxnSpPr>
+          <p:cNvPr id="85" name="Straight Arrow Connector 84">
+            <a:extLst>
+              <a:ext uri="{FF2B5EF4-FFF2-40B4-BE49-F238E27FC236}">
+                <a16:creationId xmlns:a16="http://schemas.microsoft.com/office/drawing/2014/main" id="{88CD00D8-2937-4D1E-B34C-F585EA80CFF2}"/>
+              </a:ext>
+            </a:extLst>
+          </p:cNvPr>
+          <p:cNvCxnSpPr>
+            <a:endCxn id="67" idx="1"/>
+          </p:cNvCxnSpPr>
+          <p:nvPr/>
+        </p:nvCxnSpPr>
+        <p:spPr>
+          <a:xfrm flipV="1">
+            <a:off x="8496094" y="3638061"/>
+            <a:ext cx="122590" cy="8288"/>
+          </a:xfrm>
+          <a:prstGeom prst="straightConnector1">
+            <a:avLst/>
+          </a:prstGeom>
+          <a:ln>
+            <a:tailEnd type="triangle"/>
+          </a:ln>
+        </p:spPr>
+        <p:style>
+          <a:lnRef idx="1">
+            <a:schemeClr val="accent1"/>
+          </a:lnRef>
+          <a:fillRef idx="0">
+            <a:schemeClr val="accent1"/>
+          </a:fillRef>
+          <a:effectRef idx="0">
+            <a:schemeClr val="accent1"/>
+          </a:effectRef>
+          <a:fontRef idx="minor">
+            <a:schemeClr val="tx1"/>
+          </a:fontRef>
+        </p:style>
+      </p:cxnSp>
+      <p:cxnSp>
+        <p:nvCxnSpPr>
+          <p:cNvPr id="87" name="Straight Arrow Connector 86">
+            <a:extLst>
+              <a:ext uri="{FF2B5EF4-FFF2-40B4-BE49-F238E27FC236}">
+                <a16:creationId xmlns:a16="http://schemas.microsoft.com/office/drawing/2014/main" id="{EBC21220-7586-4990-A73F-9C9DB52A8116}"/>
+              </a:ext>
+            </a:extLst>
+          </p:cNvPr>
+          <p:cNvCxnSpPr>
+            <a:stCxn id="13" idx="3"/>
+          </p:cNvCxnSpPr>
+          <p:nvPr/>
+        </p:nvCxnSpPr>
+        <p:spPr>
+          <a:xfrm>
+            <a:off x="6650186" y="2680368"/>
+            <a:ext cx="1071533" cy="0"/>
+          </a:xfrm>
+          <a:prstGeom prst="straightConnector1">
+            <a:avLst/>
+          </a:prstGeom>
+          <a:ln>
+            <a:tailEnd type="triangle"/>
+          </a:ln>
+        </p:spPr>
+        <p:style>
+          <a:lnRef idx="1">
+            <a:schemeClr val="accent1"/>
+          </a:lnRef>
+          <a:fillRef idx="0">
+            <a:schemeClr val="accent1"/>
+          </a:fillRef>
+          <a:effectRef idx="0">
+            <a:schemeClr val="accent1"/>
+          </a:effectRef>
+          <a:fontRef idx="minor">
+            <a:schemeClr val="tx1"/>
+          </a:fontRef>
+        </p:style>
+      </p:cxnSp>
+      <p:cxnSp>
+        <p:nvCxnSpPr>
+          <p:cNvPr id="89" name="Straight Arrow Connector 88">
+            <a:extLst>
+              <a:ext uri="{FF2B5EF4-FFF2-40B4-BE49-F238E27FC236}">
+                <a16:creationId xmlns:a16="http://schemas.microsoft.com/office/drawing/2014/main" id="{51DD1E01-AA3A-47E2-8CEE-FD623F93D727}"/>
+              </a:ext>
+            </a:extLst>
+          </p:cNvPr>
+          <p:cNvCxnSpPr>
+            <a:stCxn id="5" idx="1"/>
+          </p:cNvCxnSpPr>
+          <p:nvPr/>
+        </p:nvCxnSpPr>
+        <p:spPr>
+          <a:xfrm flipH="1">
+            <a:off x="2094642" y="3815338"/>
+            <a:ext cx="484494" cy="0"/>
+          </a:xfrm>
+          <a:prstGeom prst="straightConnector1">
+            <a:avLst/>
+          </a:prstGeom>
+          <a:ln>
+            <a:tailEnd type="triangle"/>
+          </a:ln>
+        </p:spPr>
+        <p:style>
+          <a:lnRef idx="1">
+            <a:schemeClr val="accent1"/>
+          </a:lnRef>
+          <a:fillRef idx="0">
+            <a:schemeClr val="accent1"/>
+          </a:fillRef>
+          <a:effectRef idx="0">
+            <a:schemeClr val="accent1"/>
+          </a:effectRef>
+          <a:fontRef idx="minor">
+            <a:schemeClr val="tx1"/>
+          </a:fontRef>
+        </p:style>
+      </p:cxnSp>
+      <p:cxnSp>
+        <p:nvCxnSpPr>
+          <p:cNvPr id="91" name="Straight Connector 90">
+            <a:extLst>
+              <a:ext uri="{FF2B5EF4-FFF2-40B4-BE49-F238E27FC236}">
+                <a16:creationId xmlns:a16="http://schemas.microsoft.com/office/drawing/2014/main" id="{F213662E-E59F-4FC1-AA89-51FF16C5FF17}"/>
+              </a:ext>
+            </a:extLst>
+          </p:cNvPr>
+          <p:cNvCxnSpPr/>
+          <p:nvPr/>
+        </p:nvCxnSpPr>
+        <p:spPr>
+          <a:xfrm>
+            <a:off x="2094642" y="2941763"/>
+            <a:ext cx="548970" cy="0"/>
+          </a:xfrm>
+          <a:prstGeom prst="line">
+            <a:avLst/>
+          </a:prstGeom>
+        </p:spPr>
+        <p:style>
+          <a:lnRef idx="1">
+            <a:schemeClr val="accent1"/>
+          </a:lnRef>
+          <a:fillRef idx="0">
+            <a:schemeClr val="accent1"/>
+          </a:fillRef>
+          <a:effectRef idx="0">
+            <a:schemeClr val="accent1"/>
+          </a:effectRef>
+          <a:fontRef idx="minor">
+            <a:schemeClr val="tx1"/>
+          </a:fontRef>
+        </p:style>
+      </p:cxnSp>
+      <p:cxnSp>
+        <p:nvCxnSpPr>
+          <p:cNvPr id="93" name="Straight Connector 92">
+            <a:extLst>
+              <a:ext uri="{FF2B5EF4-FFF2-40B4-BE49-F238E27FC236}">
+                <a16:creationId xmlns:a16="http://schemas.microsoft.com/office/drawing/2014/main" id="{6A5FB3FA-DD86-4D13-B36C-8131CA4C3ABF}"/>
+              </a:ext>
+            </a:extLst>
+          </p:cNvPr>
+          <p:cNvCxnSpPr/>
+          <p:nvPr/>
+        </p:nvCxnSpPr>
+        <p:spPr>
+          <a:xfrm flipV="1">
+            <a:off x="2661719" y="1421394"/>
+            <a:ext cx="0" cy="1511315"/>
+          </a:xfrm>
+          <a:prstGeom prst="line">
+            <a:avLst/>
+          </a:prstGeom>
+        </p:spPr>
+        <p:style>
+          <a:lnRef idx="1">
+            <a:schemeClr val="accent1"/>
+          </a:lnRef>
+          <a:fillRef idx="0">
+            <a:schemeClr val="accent1"/>
+          </a:fillRef>
+          <a:effectRef idx="0">
+            <a:schemeClr val="accent1"/>
+          </a:effectRef>
+          <a:fontRef idx="minor">
+            <a:schemeClr val="tx1"/>
+          </a:fontRef>
+        </p:style>
+      </p:cxnSp>
+      <p:cxnSp>
+        <p:nvCxnSpPr>
+          <p:cNvPr id="95" name="Straight Connector 94">
+            <a:extLst>
+              <a:ext uri="{FF2B5EF4-FFF2-40B4-BE49-F238E27FC236}">
+                <a16:creationId xmlns:a16="http://schemas.microsoft.com/office/drawing/2014/main" id="{3A6000D3-9BF5-42AB-9681-F7C3D3D9B800}"/>
+              </a:ext>
+            </a:extLst>
+          </p:cNvPr>
+          <p:cNvCxnSpPr/>
+          <p:nvPr/>
+        </p:nvCxnSpPr>
+        <p:spPr>
+          <a:xfrm>
+            <a:off x="2643612" y="1421394"/>
+            <a:ext cx="4517679" cy="0"/>
+          </a:xfrm>
+          <a:prstGeom prst="line">
+            <a:avLst/>
+          </a:prstGeom>
+        </p:spPr>
+        <p:style>
+          <a:lnRef idx="1">
+            <a:schemeClr val="accent1"/>
+          </a:lnRef>
+          <a:fillRef idx="0">
+            <a:schemeClr val="accent1"/>
+          </a:fillRef>
+          <a:effectRef idx="0">
+            <a:schemeClr val="accent1"/>
+          </a:effectRef>
+          <a:fontRef idx="minor">
+            <a:schemeClr val="tx1"/>
+          </a:fontRef>
+        </p:style>
+      </p:cxnSp>
+      <p:cxnSp>
+        <p:nvCxnSpPr>
+          <p:cNvPr id="97" name="Straight Connector 96">
+            <a:extLst>
+              <a:ext uri="{FF2B5EF4-FFF2-40B4-BE49-F238E27FC236}">
+                <a16:creationId xmlns:a16="http://schemas.microsoft.com/office/drawing/2014/main" id="{BA44B204-8CB2-4A4F-AA08-349A4D870412}"/>
+              </a:ext>
+            </a:extLst>
+          </p:cNvPr>
+          <p:cNvCxnSpPr>
+            <a:cxnSpLocks/>
+          </p:cNvCxnSpPr>
+          <p:nvPr/>
+        </p:nvCxnSpPr>
+        <p:spPr>
+          <a:xfrm>
+            <a:off x="7134131" y="1430448"/>
+            <a:ext cx="0" cy="580460"/>
+          </a:xfrm>
+          <a:prstGeom prst="line">
+            <a:avLst/>
+          </a:prstGeom>
+        </p:spPr>
+        <p:style>
+          <a:lnRef idx="1">
+            <a:schemeClr val="accent1"/>
+          </a:lnRef>
+          <a:fillRef idx="0">
+            <a:schemeClr val="accent1"/>
+          </a:fillRef>
+          <a:effectRef idx="0">
+            <a:schemeClr val="accent1"/>
+          </a:effectRef>
+          <a:fontRef idx="minor">
+            <a:schemeClr val="tx1"/>
+          </a:fontRef>
+        </p:style>
+      </p:cxnSp>
+      <p:cxnSp>
+        <p:nvCxnSpPr>
+          <p:cNvPr id="99" name="Straight Arrow Connector 98">
+            <a:extLst>
+              <a:ext uri="{FF2B5EF4-FFF2-40B4-BE49-F238E27FC236}">
+                <a16:creationId xmlns:a16="http://schemas.microsoft.com/office/drawing/2014/main" id="{19E99E34-9D33-409F-9ED0-28151729C397}"/>
+              </a:ext>
+            </a:extLst>
+          </p:cNvPr>
+          <p:cNvCxnSpPr/>
+          <p:nvPr/>
+        </p:nvCxnSpPr>
+        <p:spPr>
+          <a:xfrm>
+            <a:off x="7161291" y="2010908"/>
+            <a:ext cx="560428" cy="0"/>
+          </a:xfrm>
+          <a:prstGeom prst="straightConnector1">
+            <a:avLst/>
+          </a:prstGeom>
+          <a:ln>
+            <a:tailEnd type="triangle"/>
+          </a:ln>
+        </p:spPr>
+        <p:style>
+          <a:lnRef idx="1">
+            <a:schemeClr val="accent1"/>
+          </a:lnRef>
+          <a:fillRef idx="0">
+            <a:schemeClr val="accent1"/>
+          </a:fillRef>
+          <a:effectRef idx="0">
+            <a:schemeClr val="accent1"/>
+          </a:effectRef>
+          <a:fontRef idx="minor">
+            <a:schemeClr val="tx1"/>
+          </a:fontRef>
+        </p:style>
+      </p:cxnSp>
+      <p:cxnSp>
+        <p:nvCxnSpPr>
+          <p:cNvPr id="103" name="Straight Arrow Connector 102">
+            <a:extLst>
+              <a:ext uri="{FF2B5EF4-FFF2-40B4-BE49-F238E27FC236}">
+                <a16:creationId xmlns:a16="http://schemas.microsoft.com/office/drawing/2014/main" id="{728AE900-B395-4FEE-8075-307E8AB66684}"/>
+              </a:ext>
+            </a:extLst>
+          </p:cNvPr>
+          <p:cNvCxnSpPr>
+            <a:stCxn id="22" idx="3"/>
+          </p:cNvCxnSpPr>
+          <p:nvPr/>
+        </p:nvCxnSpPr>
+        <p:spPr>
+          <a:xfrm>
+            <a:off x="6650181" y="5367159"/>
+            <a:ext cx="1071538" cy="0"/>
+          </a:xfrm>
+          <a:prstGeom prst="straightConnector1">
+            <a:avLst/>
+          </a:prstGeom>
+          <a:ln>
+            <a:tailEnd type="triangle"/>
+          </a:ln>
+        </p:spPr>
+        <p:style>
+          <a:lnRef idx="1">
+            <a:schemeClr val="accent1"/>
+          </a:lnRef>
+          <a:fillRef idx="0">
+            <a:schemeClr val="accent1"/>
+          </a:fillRef>
+          <a:effectRef idx="0">
+            <a:schemeClr val="accent1"/>
+          </a:effectRef>
+          <a:fontRef idx="minor">
+            <a:schemeClr val="tx1"/>
+          </a:fontRef>
+        </p:style>
+      </p:cxnSp>
+      <p:cxnSp>
+        <p:nvCxnSpPr>
+          <p:cNvPr id="105" name="Straight Arrow Connector 104">
+            <a:extLst>
+              <a:ext uri="{FF2B5EF4-FFF2-40B4-BE49-F238E27FC236}">
+                <a16:creationId xmlns:a16="http://schemas.microsoft.com/office/drawing/2014/main" id="{A2B2DE71-09B3-44E7-9807-7040D9CD03CD}"/>
+              </a:ext>
+            </a:extLst>
+          </p:cNvPr>
+          <p:cNvCxnSpPr>
+            <a:stCxn id="18" idx="3"/>
+          </p:cNvCxnSpPr>
+          <p:nvPr/>
+        </p:nvCxnSpPr>
+        <p:spPr>
+          <a:xfrm>
+            <a:off x="6650182" y="4295569"/>
+            <a:ext cx="1071537" cy="0"/>
+          </a:xfrm>
+          <a:prstGeom prst="straightConnector1">
+            <a:avLst/>
+          </a:prstGeom>
+          <a:ln>
+            <a:tailEnd type="triangle"/>
+          </a:ln>
+        </p:spPr>
+        <p:style>
+          <a:lnRef idx="1">
+            <a:schemeClr val="accent1"/>
+          </a:lnRef>
+          <a:fillRef idx="0">
+            <a:schemeClr val="accent1"/>
+          </a:fillRef>
+          <a:effectRef idx="0">
+            <a:schemeClr val="accent1"/>
+          </a:effectRef>
+          <a:fontRef idx="minor">
+            <a:schemeClr val="tx1"/>
+          </a:fontRef>
+        </p:style>
+      </p:cxnSp>
+      <p:cxnSp>
+        <p:nvCxnSpPr>
+          <p:cNvPr id="107" name="Straight Arrow Connector 106">
+            <a:extLst>
+              <a:ext uri="{FF2B5EF4-FFF2-40B4-BE49-F238E27FC236}">
+                <a16:creationId xmlns:a16="http://schemas.microsoft.com/office/drawing/2014/main" id="{D226643D-0955-4627-8B4B-5E24D4B7B100}"/>
+              </a:ext>
+            </a:extLst>
+          </p:cNvPr>
+          <p:cNvCxnSpPr/>
+          <p:nvPr/>
+        </p:nvCxnSpPr>
+        <p:spPr>
+          <a:xfrm>
+            <a:off x="4594807" y="2287648"/>
+            <a:ext cx="947010" cy="0"/>
+          </a:xfrm>
+          <a:prstGeom prst="straightConnector1">
+            <a:avLst/>
+          </a:prstGeom>
+          <a:ln>
+            <a:solidFill>
+              <a:srgbClr val="C00000"/>
+            </a:solidFill>
+            <a:tailEnd type="triangle"/>
+          </a:ln>
+        </p:spPr>
+        <p:style>
+          <a:lnRef idx="1">
+            <a:schemeClr val="accent1"/>
+          </a:lnRef>
+          <a:fillRef idx="0">
+            <a:schemeClr val="accent1"/>
+          </a:fillRef>
+          <a:effectRef idx="0">
+            <a:schemeClr val="accent1"/>
+          </a:effectRef>
+          <a:fontRef idx="minor">
+            <a:schemeClr val="tx1"/>
+          </a:fontRef>
+        </p:style>
+      </p:cxnSp>
+      <p:cxnSp>
+        <p:nvCxnSpPr>
+          <p:cNvPr id="109" name="Straight Connector 108">
+            <a:extLst>
+              <a:ext uri="{FF2B5EF4-FFF2-40B4-BE49-F238E27FC236}">
+                <a16:creationId xmlns:a16="http://schemas.microsoft.com/office/drawing/2014/main" id="{9A950A96-3779-4A50-899F-DCA1D42A6ABC}"/>
+              </a:ext>
+            </a:extLst>
+          </p:cNvPr>
+          <p:cNvCxnSpPr/>
+          <p:nvPr/>
+        </p:nvCxnSpPr>
+        <p:spPr>
+          <a:xfrm>
+            <a:off x="5388429" y="2287648"/>
+            <a:ext cx="0" cy="771314"/>
+          </a:xfrm>
+          <a:prstGeom prst="line">
+            <a:avLst/>
+          </a:prstGeom>
+          <a:ln>
+            <a:solidFill>
+              <a:srgbClr val="C00000"/>
+            </a:solidFill>
+          </a:ln>
+        </p:spPr>
+        <p:style>
+          <a:lnRef idx="1">
+            <a:schemeClr val="accent1"/>
+          </a:lnRef>
+          <a:fillRef idx="0">
+            <a:schemeClr val="accent1"/>
+          </a:fillRef>
+          <a:effectRef idx="0">
+            <a:schemeClr val="accent1"/>
+          </a:effectRef>
+          <a:fontRef idx="minor">
+            <a:schemeClr val="tx1"/>
+          </a:fontRef>
+        </p:style>
+      </p:cxnSp>
+      <p:cxnSp>
+        <p:nvCxnSpPr>
+          <p:cNvPr id="111" name="Straight Arrow Connector 110">
+            <a:extLst>
+              <a:ext uri="{FF2B5EF4-FFF2-40B4-BE49-F238E27FC236}">
+                <a16:creationId xmlns:a16="http://schemas.microsoft.com/office/drawing/2014/main" id="{511DE49B-8463-43E0-8D4C-FB874D8F478B}"/>
+              </a:ext>
+            </a:extLst>
+          </p:cNvPr>
+          <p:cNvCxnSpPr>
+            <a:endCxn id="14" idx="1"/>
+          </p:cNvCxnSpPr>
+          <p:nvPr/>
+        </p:nvCxnSpPr>
+        <p:spPr>
+          <a:xfrm>
+            <a:off x="5410200" y="3058962"/>
+            <a:ext cx="131622" cy="0"/>
+          </a:xfrm>
+          <a:prstGeom prst="straightConnector1">
+            <a:avLst/>
+          </a:prstGeom>
+          <a:ln>
+            <a:solidFill>
+              <a:srgbClr val="C00000"/>
+            </a:solidFill>
+            <a:tailEnd type="triangle"/>
+          </a:ln>
+        </p:spPr>
+        <p:style>
+          <a:lnRef idx="1">
+            <a:schemeClr val="accent1"/>
+          </a:lnRef>
+          <a:fillRef idx="0">
+            <a:schemeClr val="accent1"/>
+          </a:fillRef>
+          <a:effectRef idx="0">
+            <a:schemeClr val="accent1"/>
+          </a:effectRef>
+          <a:fontRef idx="minor">
+            <a:schemeClr val="tx1"/>
+          </a:fontRef>
+        </p:style>
+      </p:cxnSp>
+      <p:cxnSp>
+        <p:nvCxnSpPr>
+          <p:cNvPr id="113" name="Straight Arrow Connector 112">
+            <a:extLst>
+              <a:ext uri="{FF2B5EF4-FFF2-40B4-BE49-F238E27FC236}">
+                <a16:creationId xmlns:a16="http://schemas.microsoft.com/office/drawing/2014/main" id="{9CF228CB-CCCF-47AB-9E1E-EAB4B1352419}"/>
+              </a:ext>
+            </a:extLst>
+          </p:cNvPr>
+          <p:cNvCxnSpPr>
+            <a:endCxn id="13" idx="1"/>
+          </p:cNvCxnSpPr>
+          <p:nvPr/>
+        </p:nvCxnSpPr>
+        <p:spPr>
+          <a:xfrm>
+            <a:off x="5366659" y="2669602"/>
+            <a:ext cx="175164" cy="10766"/>
+          </a:xfrm>
+          <a:prstGeom prst="straightConnector1">
+            <a:avLst/>
+          </a:prstGeom>
+          <a:ln>
+            <a:solidFill>
+              <a:srgbClr val="C00000"/>
+            </a:solidFill>
+            <a:tailEnd type="triangle"/>
+          </a:ln>
+        </p:spPr>
+        <p:style>
+          <a:lnRef idx="1">
+            <a:schemeClr val="accent1"/>
+          </a:lnRef>
+          <a:fillRef idx="0">
+            <a:schemeClr val="accent1"/>
+          </a:fillRef>
+          <a:effectRef idx="0">
+            <a:schemeClr val="accent1"/>
+          </a:effectRef>
+          <a:fontRef idx="minor">
+            <a:schemeClr val="tx1"/>
+          </a:fontRef>
+        </p:style>
+      </p:cxnSp>
+      <p:sp>
+        <p:nvSpPr>
+          <p:cNvPr id="114" name="Rectangle 113">
+            <a:extLst>
+              <a:ext uri="{FF2B5EF4-FFF2-40B4-BE49-F238E27FC236}">
+                <a16:creationId xmlns:a16="http://schemas.microsoft.com/office/drawing/2014/main" id="{A9A75D2A-5065-46B5-8BC4-9850A30B23A4}"/>
+              </a:ext>
+            </a:extLst>
+          </p:cNvPr>
+          <p:cNvSpPr/>
+          <p:nvPr/>
+        </p:nvSpPr>
+        <p:spPr>
+          <a:xfrm>
+            <a:off x="892996" y="1352644"/>
+            <a:ext cx="587458" cy="396368"/>
+          </a:xfrm>
+          <a:prstGeom prst="rect">
+            <a:avLst/>
+          </a:prstGeom>
+        </p:spPr>
+        <p:style>
+          <a:lnRef idx="2">
+            <a:schemeClr val="accent1">
+              <a:shade val="50000"/>
+            </a:schemeClr>
+          </a:lnRef>
+          <a:fillRef idx="1">
+            <a:schemeClr val="accent1"/>
+          </a:fillRef>
+          <a:effectRef idx="0">
+            <a:schemeClr val="accent1"/>
+          </a:effectRef>
+          <a:fontRef idx="minor">
+            <a:schemeClr val="lt1"/>
+          </a:fontRef>
+        </p:style>
+        <p:txBody>
+          <a:bodyPr rtlCol="0" anchor="ctr"/>
+          <a:lstStyle/>
+          <a:p>
+            <a:pPr algn="ctr"/>
+            <a:r>
+              <a:rPr lang="en-CA" sz="1000" dirty="0"/>
+              <a:t>CLOCK GEN</a:t>
+            </a:r>
+          </a:p>
+        </p:txBody>
+      </p:sp>
+    </p:spTree>
+    <p:extLst>
+      <p:ext uri="{BB962C8B-B14F-4D97-AF65-F5344CB8AC3E}">
+        <p14:creationId xmlns:p14="http://schemas.microsoft.com/office/powerpoint/2010/main" val="1141320201"/>
+      </p:ext>
+    </p:extLst>
+  </p:cSld>
+  <p:clrMapOvr>
+    <a:masterClrMapping/>
+  </p:clrMapOvr>
+</p:sld>
+</file>
+
 <file path=ppt/theme/theme1.xml><?xml version="1.0" encoding="utf-8"?>
 <a:theme xmlns:a="http://schemas.openxmlformats.org/drawingml/2006/main" name="Office Theme">
   <a:themeElements>

</xml_diff>